<commit_message>
Update Prezentácia Martin Mojžiš.pptx
</commit_message>
<xml_diff>
--- a/__prezentacia__/Prezentácia Martin Mojžiš.pptx
+++ b/__prezentacia__/Prezentácia Martin Mojžiš.pptx
@@ -22,6 +22,7 @@
     <p:sldId id="267" r:id="rId19"/>
     <p:sldId id="268" r:id="rId20"/>
     <p:sldId id="269" r:id="rId21"/>
+    <p:sldId id="270" r:id="rId22"/>
   </p:sldIdLst>
   <p:sldSz cx="24384000" cy="13716000"/>
   <p:notesSz cx="6858000" cy="9144000"/>
@@ -3480,7 +3481,7 @@
       </p:grpSpPr>
       <p:sp>
         <p:nvSpPr>
-          <p:cNvPr id="167" name="Podnikateľský plán a výhody projektu"/>
+          <p:cNvPr id="189" name="Podnikateľský plán a výhody"/>
           <p:cNvSpPr txBox="1"/>
           <p:nvPr>
             <p:ph type="title"/>
@@ -3493,28 +3494,28 @@
         </p:spPr>
         <p:txBody>
           <a:bodyPr/>
-          <a:lstStyle>
-            <a:lvl1pPr defTabSz="718184">
-              <a:defRPr sz="9744"/>
-            </a:lvl1pPr>
-          </a:lstStyle>
+          <a:lstStyle/>
           <a:p>
             <a:pPr/>
             <a:r>
-              <a:t>Podnikateľský plán a výhody projektu</a:t>
+              <a:t>Podnikateľský plán a výhody</a:t>
             </a:r>
           </a:p>
         </p:txBody>
       </p:sp>
       <p:sp>
         <p:nvSpPr>
-          <p:cNvPr id="168" name="Platforma je určená pre súkromných aj profesionálnych predajcov a kupujúcich, ktorí hľadajú spoľahlivý a inovatívny spôsob predaja alebo nákupu áut.…"/>
+          <p:cNvPr id="190" name="Platforma je určená pre súkromných aj profesionálnych predajcov a kupujúcich, ktorí hľadajú inovatívny spôsob predaja alebo nákupu áut.…"/>
           <p:cNvSpPr txBox="1"/>
           <p:nvPr>
-            <p:ph type="body" idx="1"/>
+            <p:ph type="body" sz="half" idx="1"/>
           </p:nvPr>
         </p:nvSpPr>
         <p:spPr>
+          <a:xfrm>
+            <a:off x="1790700" y="3644900"/>
+            <a:ext cx="11963400" cy="8839200"/>
+          </a:xfrm>
           <a:prstGeom prst="rect">
             <a:avLst/>
           </a:prstGeom>
@@ -3523,57 +3524,152 @@
           <a:bodyPr/>
           <a:lstStyle/>
           <a:p>
-            <a:pPr marL="566927" indent="-566927" defTabSz="767715">
-              <a:spcBef>
-                <a:spcPts val="5400"/>
-              </a:spcBef>
-              <a:defRPr sz="4836"/>
+            <a:pPr marL="481584" indent="-481584" defTabSz="652145">
+              <a:spcBef>
+                <a:spcPts val="4600"/>
+              </a:spcBef>
+              <a:defRPr sz="4108"/>
             </a:pPr>
             <a:r>
-              <a:t>Platforma je určená pre súkromných aj profesionálnych predajcov a kupujúcich, ktorí hľadajú spoľahlivý a inovatívny spôsob predaja alebo nákupu áut.</a:t>
-            </a:r>
-          </a:p>
-          <a:p>
-            <a:pPr marL="566927" indent="-566927" defTabSz="767715">
-              <a:spcBef>
-                <a:spcPts val="5400"/>
-              </a:spcBef>
-              <a:defRPr sz="4836"/>
+              <a:t>Platforma je určená pre súkromných aj profesionálnych predajcov a kupujúcich, ktorí hľadajú </a:t>
+            </a:r>
+            <a:r>
+              <a:rPr b="1">
+                <a:latin typeface="Helvetica"/>
+                <a:ea typeface="Helvetica"/>
+                <a:cs typeface="Helvetica"/>
+                <a:sym typeface="Helvetica"/>
+              </a:rPr>
+              <a:t>inovatívny spôsob predaja alebo nákupu áut</a:t>
+            </a:r>
+            <a:r>
+              <a:t>.</a:t>
+            </a:r>
+          </a:p>
+          <a:p>
+            <a:pPr marL="481584" indent="-481584" defTabSz="652145">
+              <a:spcBef>
+                <a:spcPts val="4600"/>
+              </a:spcBef>
+              <a:defRPr sz="4108"/>
             </a:pPr>
             <a:r>
-              <a:t>Naša konkurenčná výhoda spočíva v komplexnej integrácii služieb a v použití AI technológií, ktoré konkurencia neponúka.</a:t>
-            </a:r>
-          </a:p>
-          <a:p>
-            <a:pPr marL="566927" indent="-566927" defTabSz="767715">
-              <a:spcBef>
-                <a:spcPts val="5400"/>
-              </a:spcBef>
-              <a:defRPr sz="4836"/>
+              <a:t>Lokalizované pre </a:t>
+            </a:r>
+            <a:r>
+              <a:rPr b="1">
+                <a:latin typeface="Helvetica"/>
+                <a:ea typeface="Helvetica"/>
+                <a:cs typeface="Helvetica"/>
+                <a:sym typeface="Helvetica"/>
+              </a:rPr>
+              <a:t>Slovensko</a:t>
+            </a:r>
+            <a:r>
+              <a:t>.</a:t>
+            </a:r>
+          </a:p>
+          <a:p>
+            <a:pPr marL="481584" indent="-481584" defTabSz="652145">
+              <a:spcBef>
+                <a:spcPts val="4600"/>
+              </a:spcBef>
+              <a:defRPr sz="4108"/>
             </a:pPr>
             <a:r>
-              <a:t>Finančný model: príjmy z prémiových inzerátov, balíkov pre predajcov, provízií z dielov a servisu.</a:t>
-            </a:r>
-          </a:p>
-          <a:p>
-            <a:pPr marL="566927" indent="-566927" defTabSz="767715">
-              <a:spcBef>
-                <a:spcPts val="5400"/>
-              </a:spcBef>
-              <a:defRPr sz="4836"/>
+              <a:t>Naša konkurenčná výhoda spočíva v integrácii služieb a v </a:t>
+            </a:r>
+            <a:r>
+              <a:rPr b="1">
+                <a:latin typeface="Helvetica"/>
+                <a:ea typeface="Helvetica"/>
+                <a:cs typeface="Helvetica"/>
+                <a:sym typeface="Helvetica"/>
+              </a:rPr>
+              <a:t>použití AI technológií</a:t>
+            </a:r>
+            <a:r>
+              <a:t>, ktoré konkurencia neponúka.</a:t>
+            </a:r>
+          </a:p>
+          <a:p>
+            <a:pPr marL="481584" indent="-481584" defTabSz="652145">
+              <a:spcBef>
+                <a:spcPts val="4600"/>
+              </a:spcBef>
+              <a:defRPr sz="4108"/>
             </a:pPr>
             <a:r>
-              <a:t>Bod zlomu sa očakáva v druhom roku prevádzky, kedy by mal projekt začať generovať zisk. </a:t>
+              <a:t>Finančný model: príjmy z </a:t>
+            </a:r>
+            <a:r>
+              <a:rPr b="1">
+                <a:latin typeface="Helvetica"/>
+                <a:ea typeface="Helvetica"/>
+                <a:cs typeface="Helvetica"/>
+                <a:sym typeface="Helvetica"/>
+              </a:rPr>
+              <a:t>predplatných plánov</a:t>
+            </a:r>
+            <a:r>
+              <a:t> pre zákazníkov a predajcov, provízií z predajov, dielov a servisu.</a:t>
             </a:r>
           </a:p>
         </p:txBody>
       </p:sp>
+      <p:pic>
+        <p:nvPicPr>
+          <p:cNvPr id="191" name="CleanShot 2025-05-21 at 01.59.04@2x.png" descr="CleanShot 2025-05-21 at 01.59.04@2x.png"/>
+          <p:cNvPicPr>
+            <a:picLocks noChangeAspect="1"/>
+          </p:cNvPicPr>
+          <p:nvPr/>
+        </p:nvPicPr>
+        <p:blipFill>
+          <a:blip r:embed="rId2">
+            <a:extLst/>
+          </a:blip>
+          <a:stretch>
+            <a:fillRect/>
+          </a:stretch>
+        </p:blipFill>
+        <p:spPr>
+          <a:xfrm>
+            <a:off x="14107041" y="5588000"/>
+            <a:ext cx="9819759" cy="4940300"/>
+          </a:xfrm>
+          <a:prstGeom prst="rect">
+            <a:avLst/>
+          </a:prstGeom>
+          <a:ln w="25400">
+            <a:miter lim="400000"/>
+          </a:ln>
+          <a:effectLst>
+            <a:outerShdw sx="100000" sy="100000" kx="0" ky="0" algn="b" rotWithShape="0" blurRad="254000" dist="127000" dir="5400000">
+              <a:srgbClr val="000000">
+                <a:alpha val="70000"/>
+              </a:srgbClr>
+            </a:outerShdw>
+          </a:effectLst>
+        </p:spPr>
+      </p:pic>
     </p:spTree>
   </p:cSld>
   <p:clrMapOvr>
     <a:masterClrMapping/>
   </p:clrMapOvr>
-  <p:transition xmlns:p14="http://schemas.microsoft.com/office/powerpoint/2010/main" spd="med" advClick="1"/>
+  <mc:AlternateContent xmlns:mc="http://schemas.openxmlformats.org/markup-compatibility/2006">
+    <mc:Choice xmlns:p159="http://schemas.microsoft.com/office/powerpoint/2015/09/main" Requires="p159">
+      <p:transition xmlns:p14="http://schemas.microsoft.com/office/powerpoint/2010/main" spd="slow" advClick="1" p14:dur="2000">
+        <p159:morph option="byObject"/>
+      </p:transition>
+    </mc:Choice>
+    <mc:Fallback>
+      <p:transition spd="slow">
+        <p:fade/>
+      </p:transition>
+    </mc:Fallback>
+  </mc:AlternateContent>
 </p:sld>
 </file>
 
@@ -3596,7 +3692,7 @@
       </p:grpSpPr>
       <p:sp>
         <p:nvSpPr>
-          <p:cNvPr id="170" name="Marketingový plán a stratégia projektu"/>
+          <p:cNvPr id="193" name="Marketingový plán a stratégia"/>
           <p:cNvSpPr txBox="1"/>
           <p:nvPr>
             <p:ph type="title"/>
@@ -3609,22 +3705,18 @@
         </p:spPr>
         <p:txBody>
           <a:bodyPr/>
-          <a:lstStyle>
-            <a:lvl1pPr defTabSz="701675">
-              <a:defRPr sz="9520"/>
-            </a:lvl1pPr>
-          </a:lstStyle>
+          <a:lstStyle/>
           <a:p>
             <a:pPr/>
             <a:r>
-              <a:t>Marketingový plán a stratégia projektu</a:t>
+              <a:t>Marketingový plán a stratégia</a:t>
             </a:r>
           </a:p>
         </p:txBody>
       </p:sp>
       <p:sp>
         <p:nvSpPr>
-          <p:cNvPr id="171" name="Tradičný marketing a PR: tlačové správy, spolupráca s médiami, dôraz na dôveryhodnosť a profesionalitu platformy.…"/>
+          <p:cNvPr id="194" name="Referral marketing: systém odporúčaní s odmenami pre používateľov za získanie nových klientov.…"/>
           <p:cNvSpPr txBox="1"/>
           <p:nvPr>
             <p:ph type="body" idx="1"/>
@@ -3641,25 +3733,46 @@
           <a:p>
             <a:pPr/>
             <a:r>
-              <a:t>Tradičný marketing a PR: tlačové správy, spolupráca s médiami, dôraz na dôveryhodnosť a profesionalitu platformy.</a:t>
+              <a:rPr b="1">
+                <a:latin typeface="Helvetica"/>
+                <a:ea typeface="Helvetica"/>
+                <a:cs typeface="Helvetica"/>
+                <a:sym typeface="Helvetica"/>
+              </a:rPr>
+              <a:t>Referral marketing</a:t>
+            </a:r>
+            <a:r>
+              <a:t>: systém odporúčaní s odmenami pre používateľov za získanie nových klientov.</a:t>
             </a:r>
           </a:p>
           <a:p>
             <a:pPr/>
             <a:r>
-              <a:t>Referral marketing: systém odporúčaní s odmenami pre používateľov za získanie nových klientov.</a:t>
+              <a:rPr b="1">
+                <a:latin typeface="Helvetica"/>
+                <a:ea typeface="Helvetica"/>
+                <a:cs typeface="Helvetica"/>
+                <a:sym typeface="Helvetica"/>
+              </a:rPr>
+              <a:t>Affiliate marketing</a:t>
+            </a:r>
+            <a:r>
+              <a:t>: spolupráca s partnermi, ktorí získajú províziu za propagáciu a konverzie.</a:t>
             </a:r>
           </a:p>
           <a:p>
             <a:pPr/>
             <a:r>
-              <a:t>Affiliate marketing: spolupráca s partnermi, ktorí získajú províziu za propagáciu a konverzie.</a:t>
-            </a:r>
-          </a:p>
-          <a:p>
-            <a:pPr/>
-            <a:r>
-              <a:t>Community marketing: budovanie komunity cez blogy, diskusie, webináre a offline stretnutia.</a:t>
+              <a:rPr b="1">
+                <a:latin typeface="Helvetica"/>
+                <a:ea typeface="Helvetica"/>
+                <a:cs typeface="Helvetica"/>
+                <a:sym typeface="Helvetica"/>
+              </a:rPr>
+              <a:t>Community marketing</a:t>
+            </a:r>
+            <a:r>
+              <a:t>: budovanie komunity cez blogy, diskusie, webináre a offline stretnutia.</a:t>
             </a:r>
           </a:p>
         </p:txBody>
@@ -3669,7 +3782,18 @@
   <p:clrMapOvr>
     <a:masterClrMapping/>
   </p:clrMapOvr>
-  <p:transition xmlns:p14="http://schemas.microsoft.com/office/powerpoint/2010/main" spd="med" advClick="1"/>
+  <mc:AlternateContent xmlns:mc="http://schemas.openxmlformats.org/markup-compatibility/2006">
+    <mc:Choice xmlns:p159="http://schemas.microsoft.com/office/powerpoint/2015/09/main" Requires="p159">
+      <p:transition xmlns:p14="http://schemas.microsoft.com/office/powerpoint/2010/main" spd="slow" advClick="1" p14:dur="2000">
+        <p159:morph option="byObject"/>
+      </p:transition>
+    </mc:Choice>
+    <mc:Fallback>
+      <p:transition spd="slow">
+        <p:fade/>
+      </p:transition>
+    </mc:Fallback>
+  </mc:AlternateContent>
 </p:sld>
 </file>
 
@@ -3692,7 +3816,7 @@
       </p:grpSpPr>
       <p:sp>
         <p:nvSpPr>
-          <p:cNvPr id="173" name="Plány na projekte do budúcnosti"/>
+          <p:cNvPr id="196" name="Plány do budúcnosti"/>
           <p:cNvSpPr txBox="1"/>
           <p:nvPr>
             <p:ph type="title"/>
@@ -3709,14 +3833,14 @@
           <a:p>
             <a:pPr/>
             <a:r>
-              <a:t>Plány na projekte do budúcnosti </a:t>
+              <a:t>Plány do budúcnosti </a:t>
             </a:r>
           </a:p>
         </p:txBody>
       </p:sp>
       <p:sp>
         <p:nvSpPr>
-          <p:cNvPr id="174" name="Produktové:…"/>
+          <p:cNvPr id="197" name="Produktové:…"/>
           <p:cNvSpPr txBox="1"/>
           <p:nvPr>
             <p:ph type="body" sz="half" idx="1"/>
@@ -3760,7 +3884,7 @@
               <a:defRPr sz="3500"/>
             </a:pPr>
             <a:r>
-              <a:t>Internacionalizácia - rozšírenie prekladov</a:t>
+              <a:t>Porovnávanie vozidiel</a:t>
             </a:r>
           </a:p>
           <a:p>
@@ -3768,7 +3892,7 @@
               <a:defRPr sz="3500"/>
             </a:pPr>
             <a:r>
-              <a:t>Dokončenie modulu Virtuálny servis / Online diagnostika</a:t>
+              <a:t>Internacionalizácia - rozšírenie prekladov</a:t>
             </a:r>
           </a:p>
           <a:p>
@@ -3776,21 +3900,29 @@
               <a:defRPr sz="3500"/>
             </a:pPr>
             <a:r>
-              <a:t>Implementácia platobnej brány</a:t>
+              <a:t>Dokončenie modulu Virtuálny servis</a:t>
+            </a:r>
+          </a:p>
+          <a:p>
+            <a:pPr lvl="1" marL="1019907" indent="-410307">
+              <a:defRPr sz="3500"/>
+            </a:pPr>
+            <a:r>
+              <a:t>Modul na referral a affiliate marketing</a:t>
             </a:r>
           </a:p>
         </p:txBody>
       </p:sp>
       <p:sp>
         <p:nvSpPr>
-          <p:cNvPr id="175" name="Technické:…"/>
+          <p:cNvPr id="198" name="Technické:…"/>
           <p:cNvSpPr txBox="1"/>
           <p:nvPr/>
         </p:nvSpPr>
         <p:spPr>
           <a:xfrm>
             <a:off x="11569700" y="4152900"/>
-            <a:ext cx="14274800" cy="8331200"/>
+            <a:ext cx="12458700" cy="8864600"/>
           </a:xfrm>
           <a:prstGeom prst="rect">
             <a:avLst/>
@@ -3831,7 +3963,7 @@
               <a:defRPr sz="3500"/>
             </a:pPr>
             <a:r>
-              <a:t>Napojenie na API pre dáta o vozidlách a autodieloch</a:t>
+              <a:t>Napojenie na pokročilejšiu API pre dáta o vozidlách a autodieloch</a:t>
             </a:r>
           </a:p>
           <a:p>
@@ -3851,7 +3983,7 @@
               <a:defRPr sz="3500"/>
             </a:pPr>
             <a:r>
-              <a:t>Optimalizácia serverov - loadbalancing</a:t>
+              <a:t>Transcoding nahraných obrázkov</a:t>
             </a:r>
           </a:p>
           <a:p>
@@ -3861,7 +3993,7 @@
               <a:defRPr sz="3500"/>
             </a:pPr>
             <a:r>
-              <a:t>Optimalizácia cache - Redis</a:t>
+              <a:t>Napojenie na AI API pre rozpoznávanie obrázkov a videí</a:t>
             </a:r>
           </a:p>
           <a:p>
@@ -3871,7 +4003,7 @@
               <a:defRPr sz="3500"/>
             </a:pPr>
             <a:r>
-              <a:t>Transcoding nahraných obrázkov</a:t>
+              <a:t>Optimalizácia cache - Redis</a:t>
             </a:r>
           </a:p>
           <a:p>
@@ -3881,7 +4013,7 @@
               <a:defRPr sz="3500"/>
             </a:pPr>
             <a:r>
-              <a:t>Napojenie na API pre rozpoznávanie obrázkov a videí</a:t>
+              <a:t>Optimalizácia serverov - loadbalancing</a:t>
             </a:r>
           </a:p>
         </p:txBody>
@@ -3891,7 +4023,18 @@
   <p:clrMapOvr>
     <a:masterClrMapping/>
   </p:clrMapOvr>
-  <p:transition xmlns:p14="http://schemas.microsoft.com/office/powerpoint/2010/main" spd="med" advClick="1"/>
+  <mc:AlternateContent xmlns:mc="http://schemas.openxmlformats.org/markup-compatibility/2006">
+    <mc:Choice xmlns:p159="http://schemas.microsoft.com/office/powerpoint/2015/09/main" Requires="p159">
+      <p:transition xmlns:p14="http://schemas.microsoft.com/office/powerpoint/2010/main" spd="slow" advClick="1" p14:dur="2000">
+        <p159:morph option="byObject"/>
+      </p:transition>
+    </mc:Choice>
+    <mc:Fallback>
+      <p:transition spd="slow">
+        <p:fade/>
+      </p:transition>
+    </mc:Fallback>
+  </mc:AlternateContent>
 </p:sld>
 </file>
 
@@ -3914,7 +4057,7 @@
       </p:grpSpPr>
       <p:sp>
         <p:nvSpPr>
-          <p:cNvPr id="177" name="Čo som dosiahol"/>
+          <p:cNvPr id="200" name="Zhrnutie"/>
           <p:cNvSpPr txBox="1"/>
           <p:nvPr>
             <p:ph type="title"/>
@@ -3931,14 +4074,14 @@
           <a:p>
             <a:pPr/>
             <a:r>
-              <a:t>Čo som dosiahol</a:t>
+              <a:t>Zhrnutie</a:t>
             </a:r>
           </a:p>
         </p:txBody>
       </p:sp>
       <p:sp>
         <p:nvSpPr>
-          <p:cNvPr id="178" name="Postavil som funkčný backend vrátane API a CMS rozhrania s prepojením na viacero externých API.…"/>
+          <p:cNvPr id="201" name="Postavil som funkčný backend vrátane API a CMS rozhrania s prepojením na viacero externých API.…"/>
           <p:cNvSpPr txBox="1"/>
           <p:nvPr>
             <p:ph type="body" idx="1"/>
@@ -3953,27 +4096,47 @@
           <a:bodyPr/>
           <a:lstStyle/>
           <a:p>
-            <a:pPr/>
+            <a:pPr marL="603504" indent="-603504" defTabSz="817244">
+              <a:spcBef>
+                <a:spcPts val="5800"/>
+              </a:spcBef>
+              <a:defRPr sz="5148"/>
+            </a:pPr>
             <a:r>
               <a:t>Postavil som funkčný backend vrátane API a CMS rozhrania s prepojením na viacero externých API.</a:t>
             </a:r>
           </a:p>
           <a:p>
-            <a:pPr/>
+            <a:pPr marL="603504" indent="-603504" defTabSz="817244">
+              <a:spcBef>
+                <a:spcPts val="5800"/>
+              </a:spcBef>
+              <a:defRPr sz="5148"/>
+            </a:pPr>
             <a:r>
               <a:t>Celý vývoj som zvládol sám - od návrhu po nasadenie.</a:t>
             </a:r>
           </a:p>
           <a:p>
-            <a:pPr/>
-            <a:r>
-              <a:t>Získal som nové zručnosti z oblasti DevOps, bezpečnosti, API integrácií aj podnikania ktoré môžem využiť pri ďalších projektoch.</a:t>
-            </a:r>
-          </a:p>
-          <a:p>
-            <a:pPr/>
-            <a:r>
-              <a:t>Prekonal som aj svoje očakávania - podarilo sa mi úspešne integrovať OpenAI API na generovanie popisov inzerátov.</a:t>
+            <a:pPr marL="603504" indent="-603504" defTabSz="817244">
+              <a:spcBef>
+                <a:spcPts val="5800"/>
+              </a:spcBef>
+              <a:defRPr sz="5148"/>
+            </a:pPr>
+            <a:r>
+              <a:t>Získal som nové zručnosti z oblasti DevOps, bezpečnosti, API integrácií a aj podnikania ktoré môžem využiť pri ďalších projektoch.</a:t>
+            </a:r>
+          </a:p>
+          <a:p>
+            <a:pPr marL="603504" indent="-603504" defTabSz="817244">
+              <a:spcBef>
+                <a:spcPts val="5800"/>
+              </a:spcBef>
+              <a:defRPr sz="5148"/>
+            </a:pPr>
+            <a:r>
+              <a:t>Prekonal som aj svoje očakávania - podarilo sa mi úspešne integrovať platobnú bránu Stripe API a OpenAI API na generovanie popisov inzerátov a online diagnostiku vozidla.</a:t>
             </a:r>
           </a:p>
         </p:txBody>
@@ -3983,7 +4146,18 @@
   <p:clrMapOvr>
     <a:masterClrMapping/>
   </p:clrMapOvr>
-  <p:transition xmlns:p14="http://schemas.microsoft.com/office/powerpoint/2010/main" spd="med" advClick="1"/>
+  <mc:AlternateContent xmlns:mc="http://schemas.openxmlformats.org/markup-compatibility/2006">
+    <mc:Choice xmlns:p159="http://schemas.microsoft.com/office/powerpoint/2015/09/main" Requires="p159">
+      <p:transition xmlns:p14="http://schemas.microsoft.com/office/powerpoint/2010/main" spd="slow" advClick="1" p14:dur="2000">
+        <p159:morph option="byObject"/>
+      </p:transition>
+    </mc:Choice>
+    <mc:Fallback>
+      <p:transition spd="slow">
+        <p:fade/>
+      </p:transition>
+    </mc:Fallback>
+  </mc:AlternateContent>
 </p:sld>
 </file>
 
@@ -4006,7 +4180,7 @@
       </p:grpSpPr>
       <p:sp>
         <p:nvSpPr>
-          <p:cNvPr id="180" name="Ďakujem za pozornosť"/>
+          <p:cNvPr id="203" name="Ďakujem za pozornosť a možnosť obhajovať svoju prácu"/>
           <p:cNvSpPr txBox="1"/>
           <p:nvPr>
             <p:ph type="title"/>
@@ -4014,7 +4188,7 @@
         </p:nvSpPr>
         <p:spPr>
           <a:xfrm>
-            <a:off x="2387600" y="2298700"/>
+            <a:off x="2387600" y="1066800"/>
             <a:ext cx="19621500" cy="4648200"/>
           </a:xfrm>
           <a:prstGeom prst="rect">
@@ -4023,18 +4197,22 @@
         </p:spPr>
         <p:txBody>
           <a:bodyPr anchor="b"/>
-          <a:lstStyle/>
+          <a:lstStyle>
+            <a:lvl1pPr defTabSz="784225">
+              <a:defRPr sz="10640"/>
+            </a:lvl1pPr>
+          </a:lstStyle>
           <a:p>
             <a:pPr/>
             <a:r>
-              <a:t>Ďakujem za pozornosť</a:t>
+              <a:t>Ďakujem za pozornosť a možnosť obhajovať svoju prácu</a:t>
             </a:r>
           </a:p>
         </p:txBody>
       </p:sp>
       <p:sp>
         <p:nvSpPr>
-          <p:cNvPr id="181" name="Martin Mojžiš, IV.D"/>
+          <p:cNvPr id="204" name="Martin Mojžiš, IV.D"/>
           <p:cNvSpPr txBox="1"/>
           <p:nvPr>
             <p:ph type="body" sz="quarter" idx="1"/>
@@ -4042,7 +4220,7 @@
         </p:nvSpPr>
         <p:spPr>
           <a:xfrm>
-            <a:off x="2387600" y="7493000"/>
+            <a:off x="2387600" y="9677400"/>
             <a:ext cx="19621500" cy="1587500"/>
           </a:xfrm>
           <a:prstGeom prst="rect">
@@ -4050,7 +4228,7 @@
           </a:prstGeom>
         </p:spPr>
         <p:txBody>
-          <a:bodyPr anchor="t"/>
+          <a:bodyPr/>
           <a:lstStyle>
             <a:lvl1pPr marL="0" indent="0" algn="ctr">
               <a:spcBef>
@@ -4071,7 +4249,7 @@
       </p:sp>
       <p:sp>
         <p:nvSpPr>
-          <p:cNvPr id="182" name="Bratislava, 2025"/>
+          <p:cNvPr id="205" name="Bratislava, 2025"/>
           <p:cNvSpPr txBox="1"/>
           <p:nvPr/>
         </p:nvSpPr>
@@ -4112,12 +4290,572 @@
           </a:p>
         </p:txBody>
       </p:sp>
+      <p:sp>
+        <p:nvSpPr>
+          <p:cNvPr id="206" name="Rád by som ešte poďakoval môjmu konzultantovi Ing. Dominikovi Zatkalíkovi, PhD. za cenné pripomienky a odborné rady, ktorými prispel k vypracovaniu tejto maturitnej práce. Ďalej ďakujem Lukášovi Kozovi zo spoločnosti Wezeo, za poskytnuté informácie a kon"/>
+          <p:cNvSpPr txBox="1"/>
+          <p:nvPr/>
+        </p:nvSpPr>
+        <p:spPr>
+          <a:xfrm>
+            <a:off x="2387600" y="6667500"/>
+            <a:ext cx="19621500" cy="2120900"/>
+          </a:xfrm>
+          <a:prstGeom prst="rect">
+            <a:avLst/>
+          </a:prstGeom>
+          <a:ln w="12700">
+            <a:miter lim="400000"/>
+          </a:ln>
+          <a:extLst>
+            <a:ext uri="{C572A759-6A51-4108-AA02-DFA0A04FC94B}">
+              <ma14:wrappingTextBoxFlag xmlns:ma14="http://schemas.microsoft.com/office/mac/drawingml/2011/main" val="1"/>
+            </a:ext>
+          </a:extLst>
+        </p:spPr>
+        <p:txBody>
+          <a:bodyPr lIns="50800" tIns="50800" rIns="50800" bIns="50800">
+            <a:normAutofit fontScale="100000" lnSpcReduction="0"/>
+          </a:bodyPr>
+          <a:lstStyle>
+            <a:lvl1pPr algn="ctr" defTabSz="693419">
+              <a:lnSpc>
+                <a:spcPct val="120000"/>
+              </a:lnSpc>
+              <a:spcBef>
+                <a:spcPts val="0"/>
+              </a:spcBef>
+              <a:defRPr sz="3696"/>
+            </a:lvl1pPr>
+          </a:lstStyle>
+          <a:p>
+            <a:pPr/>
+            <a:r>
+              <a:t>Rád by som ešte poďakoval môjmu konzultantovi Ing. Dominikovi Zatkalíkovi, PhD. za cenné pripomienky a odborné rady, ktorými prispel k vypracovaniu tejto maturitnej práce. Ďalej ďakujem Lukášovi Kozovi zo spoločnosti Wezeo, za poskytnuté informácie a konzultácie.</a:t>
+            </a:r>
+          </a:p>
+        </p:txBody>
+      </p:sp>
     </p:spTree>
   </p:cSld>
   <p:clrMapOvr>
     <a:masterClrMapping/>
   </p:clrMapOvr>
-  <p:transition xmlns:p14="http://schemas.microsoft.com/office/powerpoint/2010/main" spd="med" advClick="1"/>
+  <mc:AlternateContent xmlns:mc="http://schemas.openxmlformats.org/markup-compatibility/2006">
+    <mc:Choice xmlns:p159="http://schemas.microsoft.com/office/powerpoint/2015/09/main" Requires="p159">
+      <p:transition xmlns:p14="http://schemas.microsoft.com/office/powerpoint/2010/main" spd="slow" advClick="1" p14:dur="2000">
+        <p159:morph option="byObject"/>
+      </p:transition>
+    </mc:Choice>
+    <mc:Fallback>
+      <p:transition spd="slow">
+        <p:fade/>
+      </p:transition>
+    </mc:Fallback>
+  </mc:AlternateContent>
+</p:sld>
+</file>
+
+<file path=ppt/slides/slide15.xml><?xml version="1.0" encoding="utf-8"?>
+<p:sld xmlns:a="http://schemas.openxmlformats.org/drawingml/2006/main" xmlns:r="http://schemas.openxmlformats.org/officeDocument/2006/relationships" xmlns:p="http://schemas.openxmlformats.org/presentationml/2006/main" xmlns:m="http://schemas.openxmlformats.org/officeDocument/2006/math" xmlns:a14="http://schemas.microsoft.com/office/drawing/2010/main" showMasterSp="1" showMasterPhAnim="1">
+  <p:cSld>
+    <p:spTree>
+      <p:nvGrpSpPr>
+        <p:cNvPr id="1" name=""/>
+        <p:cNvGrpSpPr/>
+        <p:nvPr/>
+      </p:nvGrpSpPr>
+      <p:grpSpPr>
+        <a:xfrm>
+          <a:off x="0" y="0"/>
+          <a:ext cx="0" cy="0"/>
+          <a:chOff x="0" y="0"/>
+          <a:chExt cx="0" cy="0"/>
+        </a:xfrm>
+      </p:grpSpPr>
+      <p:sp>
+        <p:nvSpPr>
+          <p:cNvPr id="208" name="Zdroje"/>
+          <p:cNvSpPr txBox="1"/>
+          <p:nvPr>
+            <p:ph type="title"/>
+          </p:nvPr>
+        </p:nvSpPr>
+        <p:spPr>
+          <a:prstGeom prst="rect">
+            <a:avLst/>
+          </a:prstGeom>
+        </p:spPr>
+        <p:txBody>
+          <a:bodyPr/>
+          <a:lstStyle/>
+          <a:p>
+            <a:pPr/>
+            <a:r>
+              <a:t>Zdroje</a:t>
+            </a:r>
+          </a:p>
+        </p:txBody>
+      </p:sp>
+      <p:sp>
+        <p:nvSpPr>
+          <p:cNvPr id="209" name="GeeksforGeeks (2024–2025): Web Tech, Backend Dev, DevOps – geeksforgeeks.org…"/>
+          <p:cNvSpPr txBox="1"/>
+          <p:nvPr>
+            <p:ph type="body" sz="half" idx="1"/>
+          </p:nvPr>
+        </p:nvSpPr>
+        <p:spPr>
+          <a:xfrm>
+            <a:off x="1790700" y="3644900"/>
+            <a:ext cx="12153900" cy="9398000"/>
+          </a:xfrm>
+          <a:prstGeom prst="rect">
+            <a:avLst/>
+          </a:prstGeom>
+        </p:spPr>
+        <p:txBody>
+          <a:bodyPr anchor="t"/>
+          <a:lstStyle/>
+          <a:p>
+            <a:pPr marL="278774" indent="-278774" defTabSz="338454">
+              <a:lnSpc>
+                <a:spcPct val="120000"/>
+              </a:lnSpc>
+              <a:spcBef>
+                <a:spcPts val="1800"/>
+              </a:spcBef>
+              <a:defRPr sz="2378"/>
+            </a:pPr>
+            <a:r>
+              <a:t>GeeksforGeeks (2024–2025): Web Tech, Backend Dev, DevOps – </a:t>
+            </a:r>
+            <a:r>
+              <a:rPr u="sng">
+                <a:hlinkClick r:id="rId2" invalidUrl="" action="" tgtFrame="" tooltip="" history="1" highlightClick="0" endSnd="0"/>
+              </a:rPr>
+              <a:t>geeksforgeeks.org</a:t>
+            </a:r>
+          </a:p>
+          <a:p>
+            <a:pPr marL="278774" indent="-278774" defTabSz="338454">
+              <a:lnSpc>
+                <a:spcPct val="120000"/>
+              </a:lnSpc>
+              <a:spcBef>
+                <a:spcPts val="1800"/>
+              </a:spcBef>
+              <a:defRPr sz="2378"/>
+            </a:pPr>
+            <a:r>
+              <a:t>Ramsey, B. (2024): Top 10 Backend Tech – </a:t>
+            </a:r>
+            <a:r>
+              <a:rPr u="sng">
+                <a:hlinkClick r:id="rId3" invalidUrl="" action="" tgtFrame="" tooltip="" history="1" highlightClick="0" endSnd="0"/>
+              </a:rPr>
+              <a:t>scopicsoftware.com</a:t>
+            </a:r>
+          </a:p>
+          <a:p>
+            <a:pPr marL="278774" indent="-278774" defTabSz="338454">
+              <a:lnSpc>
+                <a:spcPct val="120000"/>
+              </a:lnSpc>
+              <a:spcBef>
+                <a:spcPts val="1800"/>
+              </a:spcBef>
+              <a:defRPr sz="2378"/>
+            </a:pPr>
+            <a:r>
+              <a:t>OctoberCMS (2015, 2025): Blog, Dokumentácia – </a:t>
+            </a:r>
+            <a:r>
+              <a:rPr u="sng">
+                <a:hlinkClick r:id="rId4" invalidUrl="" action="" tgtFrame="" tooltip="" history="1" highlightClick="0" endSnd="0"/>
+              </a:rPr>
+              <a:t>octobercms.com</a:t>
+            </a:r>
+          </a:p>
+          <a:p>
+            <a:pPr marL="278774" indent="-278774" defTabSz="338454">
+              <a:lnSpc>
+                <a:spcPct val="120000"/>
+              </a:lnSpc>
+              <a:spcBef>
+                <a:spcPts val="1800"/>
+              </a:spcBef>
+              <a:defRPr sz="2378"/>
+            </a:pPr>
+            <a:r>
+              <a:t>Laravel Holdings (2025): Laravel Docs – </a:t>
+            </a:r>
+            <a:r>
+              <a:rPr u="sng">
+                <a:hlinkClick r:id="rId5" invalidUrl="" action="" tgtFrame="" tooltip="" history="1" highlightClick="0" endSnd="0"/>
+              </a:rPr>
+              <a:t>laravel.com</a:t>
+            </a:r>
+          </a:p>
+          <a:p>
+            <a:pPr marL="278774" indent="-278774" defTabSz="338454">
+              <a:lnSpc>
+                <a:spcPct val="120000"/>
+              </a:lnSpc>
+              <a:spcBef>
+                <a:spcPts val="1800"/>
+              </a:spcBef>
+              <a:defRPr sz="2378"/>
+            </a:pPr>
+            <a:r>
+              <a:t>PHP Documentation Group (2025): PHP Manual – </a:t>
+            </a:r>
+            <a:r>
+              <a:rPr u="sng">
+                <a:hlinkClick r:id="rId6" invalidUrl="" action="" tgtFrame="" tooltip="" history="1" highlightClick="0" endSnd="0"/>
+              </a:rPr>
+              <a:t>php.net</a:t>
+            </a:r>
+          </a:p>
+          <a:p>
+            <a:pPr marL="278774" indent="-278774" defTabSz="338454">
+              <a:lnSpc>
+                <a:spcPct val="120000"/>
+              </a:lnSpc>
+              <a:spcBef>
+                <a:spcPts val="1800"/>
+              </a:spcBef>
+              <a:defRPr sz="2378"/>
+            </a:pPr>
+            <a:r>
+              <a:t>Adermann &amp; Boggiano (2025): Composer Docs – getcomposer.org</a:t>
+            </a:r>
+          </a:p>
+          <a:p>
+            <a:pPr marL="278774" indent="-278774" defTabSz="338454">
+              <a:lnSpc>
+                <a:spcPct val="120000"/>
+              </a:lnSpc>
+              <a:spcBef>
+                <a:spcPts val="1800"/>
+              </a:spcBef>
+              <a:defRPr sz="2378"/>
+            </a:pPr>
+            <a:r>
+              <a:t>Tymon, S. (2025): JWT Auth for Laravel – jwt-auth.readthedocs.io</a:t>
+            </a:r>
+          </a:p>
+          <a:p>
+            <a:pPr marL="278774" indent="-278774" defTabSz="338454">
+              <a:lnSpc>
+                <a:spcPct val="120000"/>
+              </a:lnSpc>
+              <a:spcBef>
+                <a:spcPts val="1800"/>
+              </a:spcBef>
+              <a:defRPr sz="2378"/>
+            </a:pPr>
+            <a:r>
+              <a:t>W3Schools (2025): MySQL Tutorial – </a:t>
+            </a:r>
+            <a:r>
+              <a:rPr u="sng">
+                <a:hlinkClick r:id="rId7" invalidUrl="" action="" tgtFrame="" tooltip="" history="1" highlightClick="0" endSnd="0"/>
+              </a:rPr>
+              <a:t>w3schools.com</a:t>
+            </a:r>
+          </a:p>
+          <a:p>
+            <a:pPr marL="278774" indent="-278774" defTabSz="338454">
+              <a:lnSpc>
+                <a:spcPct val="120000"/>
+              </a:lnSpc>
+              <a:spcBef>
+                <a:spcPts val="1800"/>
+              </a:spcBef>
+              <a:defRPr sz="2378"/>
+            </a:pPr>
+            <a:r>
+              <a:t>Oracle (2025): MySQL 8.4 Manual – </a:t>
+            </a:r>
+            <a:r>
+              <a:rPr u="sng">
+                <a:hlinkClick r:id="rId8" invalidUrl="" action="" tgtFrame="" tooltip="" history="1" highlightClick="0" endSnd="0"/>
+              </a:rPr>
+              <a:t>mysql.com</a:t>
+            </a:r>
+          </a:p>
+          <a:p>
+            <a:pPr marL="278774" indent="-278774" defTabSz="338454">
+              <a:lnSpc>
+                <a:spcPct val="120000"/>
+              </a:lnSpc>
+              <a:spcBef>
+                <a:spcPts val="1800"/>
+              </a:spcBef>
+              <a:defRPr sz="2378"/>
+            </a:pPr>
+            <a:r>
+              <a:t>Amazon (2025): S3 &amp; Lightsail Docs – </a:t>
+            </a:r>
+            <a:r>
+              <a:rPr u="sng">
+                <a:hlinkClick r:id="rId9" invalidUrl="" action="" tgtFrame="" tooltip="" history="1" highlightClick="0" endSnd="0"/>
+              </a:rPr>
+              <a:t>aws.amazon.com</a:t>
+            </a:r>
+          </a:p>
+          <a:p>
+            <a:pPr marL="278774" indent="-278774" defTabSz="338454">
+              <a:lnSpc>
+                <a:spcPct val="120000"/>
+              </a:lnSpc>
+              <a:spcBef>
+                <a:spcPts val="1800"/>
+              </a:spcBef>
+              <a:defRPr sz="2378"/>
+            </a:pPr>
+            <a:r>
+              <a:t>Bitnami (2025): LAMP Guide – </a:t>
+            </a:r>
+            <a:r>
+              <a:rPr u="sng">
+                <a:hlinkClick r:id="rId10" invalidUrl="" action="" tgtFrame="" tooltip="" history="1" highlightClick="0" endSnd="0"/>
+              </a:rPr>
+              <a:t>bitnami.com</a:t>
+            </a:r>
+          </a:p>
+          <a:p>
+            <a:pPr marL="278774" indent="-278774" defTabSz="338454">
+              <a:lnSpc>
+                <a:spcPct val="120000"/>
+              </a:lnSpc>
+              <a:spcBef>
+                <a:spcPts val="1800"/>
+              </a:spcBef>
+              <a:defRPr sz="2378"/>
+            </a:pPr>
+            <a:r>
+              <a:t>Google Cloud (2025): Cloud Docs – </a:t>
+            </a:r>
+            <a:r>
+              <a:rPr u="sng">
+                <a:hlinkClick r:id="rId11" invalidUrl="" action="" tgtFrame="" tooltip="" history="1" highlightClick="0" endSnd="0"/>
+              </a:rPr>
+              <a:t>cloud.google.com</a:t>
+            </a:r>
+          </a:p>
+          <a:p>
+            <a:pPr marL="278774" indent="-278774" defTabSz="338454">
+              <a:lnSpc>
+                <a:spcPct val="120000"/>
+              </a:lnSpc>
+              <a:spcBef>
+                <a:spcPts val="1800"/>
+              </a:spcBef>
+              <a:defRPr sz="2378"/>
+            </a:pPr>
+            <a:r>
+              <a:t>OpenAI (2025): API Docs – </a:t>
+            </a:r>
+            <a:r>
+              <a:rPr u="sng">
+                <a:hlinkClick r:id="rId12" invalidUrl="" action="" tgtFrame="" tooltip="" history="1" highlightClick="0" endSnd="0"/>
+              </a:rPr>
+              <a:t>platform.openai.com</a:t>
+            </a:r>
+          </a:p>
+          <a:p>
+            <a:pPr marL="278774" indent="-278774" defTabSz="338454">
+              <a:lnSpc>
+                <a:spcPct val="120000"/>
+              </a:lnSpc>
+              <a:spcBef>
+                <a:spcPts val="1800"/>
+              </a:spcBef>
+              <a:defRPr sz="2378"/>
+            </a:pPr>
+            <a:r>
+              <a:t>Algolia (2025): Search Docs – </a:t>
+            </a:r>
+            <a:r>
+              <a:rPr u="sng">
+                <a:hlinkClick r:id="rId13" invalidUrl="" action="" tgtFrame="" tooltip="" history="1" highlightClick="0" endSnd="0"/>
+              </a:rPr>
+              <a:t>algolia.com</a:t>
+            </a:r>
+          </a:p>
+        </p:txBody>
+      </p:sp>
+      <p:sp>
+        <p:nvSpPr>
+          <p:cNvPr id="210" name="Postman (2025): API Docs – learning.postman.com…"/>
+          <p:cNvSpPr txBox="1"/>
+          <p:nvPr/>
+        </p:nvSpPr>
+        <p:spPr>
+          <a:xfrm>
+            <a:off x="13944600" y="3556000"/>
+            <a:ext cx="10261600" cy="9486900"/>
+          </a:xfrm>
+          <a:prstGeom prst="rect">
+            <a:avLst/>
+          </a:prstGeom>
+          <a:ln w="12700">
+            <a:miter lim="400000"/>
+          </a:ln>
+          <a:extLst>
+            <a:ext uri="{C572A759-6A51-4108-AA02-DFA0A04FC94B}">
+              <ma14:wrappingTextBoxFlag xmlns:ma14="http://schemas.microsoft.com/office/mac/drawingml/2011/main" val="1"/>
+            </a:ext>
+          </a:extLst>
+        </p:spPr>
+        <p:txBody>
+          <a:bodyPr lIns="50800" tIns="50800" rIns="50800" bIns="50800">
+            <a:normAutofit fontScale="100000" lnSpcReduction="0"/>
+          </a:bodyPr>
+          <a:lstStyle/>
+          <a:p>
+            <a:pPr marL="281353" indent="-281353">
+              <a:lnSpc>
+                <a:spcPct val="20000"/>
+              </a:lnSpc>
+              <a:buSzPct val="75000"/>
+              <a:buChar char="•"/>
+              <a:defRPr sz="2400"/>
+            </a:pPr>
+            <a:r>
+              <a:t>Postman (2025): API Docs – </a:t>
+            </a:r>
+            <a:r>
+              <a:rPr u="sng">
+                <a:hlinkClick r:id="rId14" invalidUrl="" action="" tgtFrame="" tooltip="" history="1" highlightClick="0" endSnd="0"/>
+              </a:rPr>
+              <a:t>learning.postman.com</a:t>
+            </a:r>
+          </a:p>
+          <a:p>
+            <a:pPr marL="281353" indent="-281353">
+              <a:lnSpc>
+                <a:spcPct val="20000"/>
+              </a:lnSpc>
+              <a:buSzPct val="75000"/>
+              <a:buChar char="•"/>
+              <a:defRPr sz="2400"/>
+            </a:pPr>
+            <a:r>
+              <a:t>Mailjet (2025): Contact Mgmt – </a:t>
+            </a:r>
+            <a:r>
+              <a:rPr u="sng">
+                <a:hlinkClick r:id="rId15" invalidUrl="" action="" tgtFrame="" tooltip="" history="1" highlightClick="0" endSnd="0"/>
+              </a:rPr>
+              <a:t>dev.mailjet.com</a:t>
+            </a:r>
+          </a:p>
+          <a:p>
+            <a:pPr marL="281353" indent="-281353">
+              <a:lnSpc>
+                <a:spcPct val="20000"/>
+              </a:lnSpc>
+              <a:buSzPct val="75000"/>
+              <a:buChar char="•"/>
+              <a:defRPr sz="2400"/>
+            </a:pPr>
+            <a:r>
+              <a:t>Setweb.sk (2024): Cache v Backende – setweb.sk</a:t>
+            </a:r>
+          </a:p>
+          <a:p>
+            <a:pPr marL="281353" indent="-281353">
+              <a:lnSpc>
+                <a:spcPct val="20000"/>
+              </a:lnSpc>
+              <a:buSzPct val="75000"/>
+              <a:buChar char="•"/>
+              <a:defRPr sz="2400"/>
+            </a:pPr>
+            <a:r>
+              <a:t>WSupport.sk (2024): Doména, DNS – websupport.sk</a:t>
+            </a:r>
+          </a:p>
+          <a:p>
+            <a:pPr marL="281353" indent="-281353">
+              <a:lnSpc>
+                <a:spcPct val="20000"/>
+              </a:lnSpc>
+              <a:buSzPct val="75000"/>
+              <a:buChar char="•"/>
+              <a:defRPr sz="2400"/>
+            </a:pPr>
+            <a:r>
+              <a:t>Gupta, L. (2023): REST API – </a:t>
+            </a:r>
+            <a:r>
+              <a:rPr u="sng">
+                <a:hlinkClick r:id="rId16" invalidUrl="" action="" tgtFrame="" tooltip="" history="1" highlightClick="0" endSnd="0"/>
+              </a:rPr>
+              <a:t>restfulapi.net</a:t>
+            </a:r>
+          </a:p>
+          <a:p>
+            <a:pPr marL="281353" indent="-281353">
+              <a:lnSpc>
+                <a:spcPct val="20000"/>
+              </a:lnSpc>
+              <a:buSzPct val="75000"/>
+              <a:buChar char="•"/>
+              <a:defRPr sz="2400"/>
+            </a:pPr>
+            <a:r>
+              <a:t>Martin, R.C. (2017): Clean Architecture, Pearson</a:t>
+            </a:r>
+          </a:p>
+          <a:p>
+            <a:pPr marL="281353" indent="-281353">
+              <a:lnSpc>
+                <a:spcPct val="20000"/>
+              </a:lnSpc>
+              <a:buSzPct val="75000"/>
+              <a:buChar char="•"/>
+              <a:defRPr sz="2400"/>
+            </a:pPr>
+            <a:r>
+              <a:t>Podnikatelskyplan.sk (2021): Biznis plán</a:t>
+            </a:r>
+          </a:p>
+          <a:p>
+            <a:pPr marL="281353" indent="-281353">
+              <a:lnSpc>
+                <a:spcPct val="20000"/>
+              </a:lnSpc>
+              <a:buSzPct val="75000"/>
+              <a:buChar char="•"/>
+              <a:defRPr sz="2400"/>
+            </a:pPr>
+            <a:r>
+              <a:t>Euroekonom.sk (2019): Marketingový plán</a:t>
+            </a:r>
+          </a:p>
+        </p:txBody>
+      </p:sp>
+    </p:spTree>
+  </p:cSld>
+  <p:clrMapOvr>
+    <a:masterClrMapping/>
+  </p:clrMapOvr>
+  <mc:AlternateContent xmlns:mc="http://schemas.openxmlformats.org/markup-compatibility/2006">
+    <mc:Choice xmlns:p159="http://schemas.microsoft.com/office/powerpoint/2015/09/main" Requires="p159">
+      <p:transition xmlns:p14="http://schemas.microsoft.com/office/powerpoint/2010/main" spd="slow" advClick="1" p14:dur="2000">
+        <p159:morph option="byObject"/>
+      </p:transition>
+    </mc:Choice>
+    <mc:Fallback>
+      <p:transition spd="slow">
+        <p:fade/>
+      </p:transition>
+    </mc:Fallback>
+  </mc:AlternateContent>
 </p:sld>
 </file>
 
@@ -4193,7 +4931,7 @@
               <a:defRPr sz="4524"/>
             </a:pPr>
             <a:r>
-              <a:t>Použité technológie v projekte</a:t>
+              <a:t>Použité technológie a nástroje</a:t>
             </a:r>
           </a:p>
           <a:p>
@@ -4207,7 +4945,7 @@
               <a:defRPr sz="4524"/>
             </a:pPr>
             <a:r>
-              <a:t>Použité integrácie v projekte</a:t>
+              <a:t>Použité integrácie</a:t>
             </a:r>
           </a:p>
           <a:p>
@@ -4221,7 +4959,7 @@
               <a:defRPr sz="4524"/>
             </a:pPr>
             <a:r>
-              <a:t>Architektúra zdrojového kódu projektu</a:t>
+              <a:t>Architektúra zdrojového kódu</a:t>
             </a:r>
           </a:p>
           <a:p>
@@ -4235,7 +4973,7 @@
               <a:defRPr sz="4524"/>
             </a:pPr>
             <a:r>
-              <a:t>Zverejnenie projektu na doménu a proces nasadenia na server</a:t>
+              <a:t>Zverejnenie na doménu a proces nasadenia na server</a:t>
             </a:r>
           </a:p>
           <a:p>
@@ -4249,7 +4987,7 @@
               <a:defRPr sz="4524"/>
             </a:pPr>
             <a:r>
-              <a:t>Podnikateľský plán a výhody projektu</a:t>
+              <a:t>Podnikateľský plán a výhody</a:t>
             </a:r>
           </a:p>
           <a:p>
@@ -4263,7 +5001,7 @@
               <a:defRPr sz="4524"/>
             </a:pPr>
             <a:r>
-              <a:t>Marketingový plán a stratégia projektu</a:t>
+              <a:t>Marketingový plán a stratégia</a:t>
             </a:r>
           </a:p>
           <a:p>
@@ -4277,7 +5015,7 @@
               <a:defRPr sz="4524"/>
             </a:pPr>
             <a:r>
-              <a:t>Plány na projekte do budúcnosti</a:t>
+              <a:t>Plány do budúcnosti</a:t>
             </a:r>
           </a:p>
         </p:txBody>
@@ -4311,7 +5049,18 @@
   <p:clrMapOvr>
     <a:masterClrMapping/>
   </p:clrMapOvr>
-  <p:transition xmlns:p14="http://schemas.microsoft.com/office/powerpoint/2010/main" spd="med" advClick="1"/>
+  <mc:AlternateContent xmlns:mc="http://schemas.openxmlformats.org/markup-compatibility/2006">
+    <mc:Choice xmlns:p159="http://schemas.microsoft.com/office/powerpoint/2015/09/main" Requires="p159">
+      <p:transition xmlns:p14="http://schemas.microsoft.com/office/powerpoint/2010/main" spd="slow" advClick="1" p14:dur="2000">
+        <p159:morph option="byObject"/>
+      </p:transition>
+    </mc:Choice>
+    <mc:Fallback>
+      <p:transition spd="slow">
+        <p:fade/>
+      </p:transition>
+    </mc:Fallback>
+  </mc:AlternateContent>
 </p:sld>
 </file>
 
@@ -4397,7 +5146,18 @@
   <p:clrMapOvr>
     <a:masterClrMapping/>
   </p:clrMapOvr>
-  <p:transition xmlns:p14="http://schemas.microsoft.com/office/powerpoint/2010/main" spd="med" advClick="1"/>
+  <mc:AlternateContent xmlns:mc="http://schemas.openxmlformats.org/markup-compatibility/2006">
+    <mc:Choice xmlns:p159="http://schemas.microsoft.com/office/powerpoint/2015/09/main" Requires="p159">
+      <p:transition xmlns:p14="http://schemas.microsoft.com/office/powerpoint/2010/main" spd="slow" advClick="1" p14:dur="1500">
+        <p159:morph option="byObject"/>
+      </p:transition>
+    </mc:Choice>
+    <mc:Fallback>
+      <p:transition spd="slow">
+        <p:fade/>
+      </p:transition>
+    </mc:Fallback>
+  </mc:AlternateContent>
 </p:sld>
 </file>
 
@@ -4451,6 +5211,10 @@
           </p:nvPr>
         </p:nvSpPr>
         <p:spPr>
+          <a:xfrm>
+            <a:off x="1790700" y="3644900"/>
+            <a:ext cx="16040100" cy="8839200"/>
+          </a:xfrm>
           <a:prstGeom prst="rect">
             <a:avLst/>
           </a:prstGeom>
@@ -4459,31 +5223,105 @@
           <a:bodyPr/>
           <a:lstStyle/>
           <a:p>
-            <a:pPr/>
+            <a:pPr marL="554736" indent="-554736" defTabSz="751205">
+              <a:spcBef>
+                <a:spcPts val="5300"/>
+              </a:spcBef>
+              <a:defRPr sz="4732"/>
+            </a:pPr>
             <a:r>
               <a:t>Autobahn.sk je webová aplikácia zameraná na predaj nemeckých vozidiel, ako sú BMW, Porsche, Mercedes a pod.</a:t>
             </a:r>
           </a:p>
           <a:p>
-            <a:pPr/>
-            <a:r>
-              <a:t>Projekt je postavený na monolit backendovej architektúre ktorá nesie business logiku aplikácie, a REST API rozhraniach, ktoré umožňujú ľahké napojenie frontendu.</a:t>
-            </a:r>
-          </a:p>
-          <a:p>
-            <a:pPr/>
-            <a:r>
-              <a:t>Hlavným cieľom bolo vytvoriť komplexnú, rozšíriteľnú a bezpečnú backend infraštruktúru pre správu inzerátov, používateľov a ich interakcií s aplikáciou.</a:t>
+            <a:pPr marL="554736" indent="-554736" defTabSz="751205">
+              <a:spcBef>
+                <a:spcPts val="5300"/>
+              </a:spcBef>
+              <a:defRPr sz="4732"/>
+            </a:pPr>
+            <a:r>
+              <a:t>Projekt je postavený na </a:t>
+            </a:r>
+            <a:r>
+              <a:rPr b="1">
+                <a:latin typeface="Helvetica"/>
+                <a:ea typeface="Helvetica"/>
+                <a:cs typeface="Helvetica"/>
+                <a:sym typeface="Helvetica"/>
+              </a:rPr>
+              <a:t>monolit</a:t>
+            </a:r>
+            <a:r>
+              <a:t> backendovej architektúre ktorá nesie business logiku aplikácie, CMS, a REST API rozhraniach, ktoré umožňujú ľahké napojenie frontendu.</a:t>
+            </a:r>
+          </a:p>
+          <a:p>
+            <a:pPr marL="554736" indent="-554736" defTabSz="751205">
+              <a:spcBef>
+                <a:spcPts val="5300"/>
+              </a:spcBef>
+              <a:defRPr sz="4732"/>
+            </a:pPr>
+            <a:r>
+              <a:t>Hlavným cieľom bolo vytvoriť optimalizovaný, rozšíriteľný a bezpečný backend pre správu inzerátov, používateľov a ich interakcií s aplikáciou.</a:t>
             </a:r>
           </a:p>
         </p:txBody>
       </p:sp>
+      <p:pic>
+        <p:nvPicPr>
+          <p:cNvPr id="151" name="LogoAutobahn.png" descr="LogoAutobahn.png"/>
+          <p:cNvPicPr>
+            <a:picLocks noChangeAspect="1"/>
+          </p:cNvPicPr>
+          <p:nvPr/>
+        </p:nvPicPr>
+        <p:blipFill>
+          <a:blip r:embed="rId2">
+            <a:extLst/>
+          </a:blip>
+          <a:stretch>
+            <a:fillRect/>
+          </a:stretch>
+        </p:blipFill>
+        <p:spPr>
+          <a:xfrm>
+            <a:off x="18041315" y="6631206"/>
+            <a:ext cx="5809286" cy="2870201"/>
+          </a:xfrm>
+          <a:prstGeom prst="rect">
+            <a:avLst/>
+          </a:prstGeom>
+          <a:ln w="25400">
+            <a:miter lim="400000"/>
+          </a:ln>
+          <a:effectLst>
+            <a:outerShdw sx="100000" sy="100000" kx="0" ky="0" algn="b" rotWithShape="0" blurRad="254000" dist="127000" dir="5400000">
+              <a:srgbClr val="000000">
+                <a:alpha val="70000"/>
+              </a:srgbClr>
+            </a:outerShdw>
+          </a:effectLst>
+        </p:spPr>
+      </p:pic>
     </p:spTree>
   </p:cSld>
   <p:clrMapOvr>
     <a:masterClrMapping/>
   </p:clrMapOvr>
-  <p:transition xmlns:p14="http://schemas.microsoft.com/office/powerpoint/2010/main" spd="med" advClick="1"/>
+  <mc:AlternateContent xmlns:mc="http://schemas.openxmlformats.org/markup-compatibility/2006">
+    <mc:Choice xmlns:p159="http://schemas.microsoft.com/office/powerpoint/2015/09/main" Requires="p159">
+      <p:transition xmlns:p14="http://schemas.microsoft.com/office/powerpoint/2010/main" spd="slow" advClick="1" p14:dur="2000">
+        <p159:morph option="byObject"/>
+      </p:transition>
+    </mc:Choice>
+    <mc:Fallback>
+      <p:transition spd="slow">
+        <p:fade/>
+      </p:transition>
+    </mc:Fallback>
+  </mc:AlternateContent>
 </p:sld>
 </file>
 
@@ -4506,7 +5344,7 @@
       </p:grpSpPr>
       <p:sp>
         <p:nvSpPr>
-          <p:cNvPr id="152" name="Proces návrhu projektu"/>
+          <p:cNvPr id="153" name="Proces návrhu projektu"/>
           <p:cNvSpPr txBox="1"/>
           <p:nvPr>
             <p:ph type="title"/>
@@ -4530,13 +5368,17 @@
       </p:sp>
       <p:sp>
         <p:nvSpPr>
-          <p:cNvPr id="153" name="Začal som brainstormingom a analýzou konkurencie - sledoval som, čo na trhu funguje a čo nie.…"/>
+          <p:cNvPr id="154" name="Brainstorming a analýza konkurencie - sledoval som, čo na trhu funguje a čo nie.…"/>
           <p:cNvSpPr txBox="1"/>
           <p:nvPr>
-            <p:ph type="body" idx="1"/>
+            <p:ph type="body" sz="half" idx="1"/>
           </p:nvPr>
         </p:nvSpPr>
         <p:spPr>
+          <a:xfrm>
+            <a:off x="1790700" y="3644900"/>
+            <a:ext cx="13436600" cy="8839200"/>
+          </a:xfrm>
           <a:prstGeom prst="rect">
             <a:avLst/>
           </a:prstGeom>
@@ -4547,29 +5389,194 @@
           <a:p>
             <a:pPr/>
             <a:r>
-              <a:t>Začal som brainstormingom a analýzou konkurencie - sledoval som, čo na trhu funguje a čo nie.</a:t>
+              <a:rPr b="1">
+                <a:latin typeface="Helvetica"/>
+                <a:ea typeface="Helvetica"/>
+                <a:cs typeface="Helvetica"/>
+                <a:sym typeface="Helvetica"/>
+              </a:rPr>
+              <a:t>Brainstorming a analýza konkurencie</a:t>
+            </a:r>
+            <a:r>
+              <a:t> - sledoval som, čo na trhu funguje a čo nie.</a:t>
             </a:r>
           </a:p>
           <a:p>
             <a:pPr/>
             <a:r>
-              <a:t>Vypracoval som funkčnú špecifikáciu a technickú architektúru.</a:t>
+              <a:t>Vypracoval som </a:t>
+            </a:r>
+            <a:r>
+              <a:rPr b="1">
+                <a:latin typeface="Helvetica"/>
+                <a:ea typeface="Helvetica"/>
+                <a:cs typeface="Helvetica"/>
+                <a:sym typeface="Helvetica"/>
+              </a:rPr>
+              <a:t>funkčnú špecifikáciu</a:t>
+            </a:r>
+            <a:r>
+              <a:t> a </a:t>
+            </a:r>
+            <a:r>
+              <a:rPr b="1">
+                <a:latin typeface="Helvetica"/>
+                <a:ea typeface="Helvetica"/>
+                <a:cs typeface="Helvetica"/>
+                <a:sym typeface="Helvetica"/>
+              </a:rPr>
+              <a:t>technickú architektúru</a:t>
+            </a:r>
+            <a:r>
+              <a:t>.</a:t>
             </a:r>
           </a:p>
           <a:p>
             <a:pPr/>
             <a:r>
-              <a:t>Rozdelil som si úlohy do časového harmonogramu v tabuľke podľa priorít a náročnosti.</a:t>
+              <a:t>Rozdelil som si úlohy do časového </a:t>
+            </a:r>
+            <a:r>
+              <a:rPr b="1">
+                <a:latin typeface="Helvetica"/>
+                <a:ea typeface="Helvetica"/>
+                <a:cs typeface="Helvetica"/>
+                <a:sym typeface="Helvetica"/>
+              </a:rPr>
+              <a:t>harmonogramu</a:t>
+            </a:r>
+            <a:r>
+              <a:t> v tabuľke podľa priorít a náročnosti.</a:t>
             </a:r>
           </a:p>
         </p:txBody>
       </p:sp>
+      <p:pic>
+        <p:nvPicPr>
+          <p:cNvPr id="155" name="CleanShot 2025-05-21 at 01.00.32@2x.png" descr="CleanShot 2025-05-21 at 01.00.32@2x.png"/>
+          <p:cNvPicPr>
+            <a:picLocks noChangeAspect="1"/>
+          </p:cNvPicPr>
+          <p:nvPr/>
+        </p:nvPicPr>
+        <p:blipFill>
+          <a:blip r:embed="rId2">
+            <a:extLst/>
+          </a:blip>
+          <a:stretch>
+            <a:fillRect/>
+          </a:stretch>
+        </p:blipFill>
+        <p:spPr>
+          <a:xfrm>
+            <a:off x="6248400" y="11206734"/>
+            <a:ext cx="17005300" cy="2224532"/>
+          </a:xfrm>
+          <a:prstGeom prst="rect">
+            <a:avLst/>
+          </a:prstGeom>
+          <a:ln w="25400">
+            <a:miter lim="400000"/>
+          </a:ln>
+          <a:effectLst>
+            <a:outerShdw sx="100000" sy="100000" kx="0" ky="0" algn="b" rotWithShape="0" blurRad="254000" dist="127000" dir="5400000">
+              <a:srgbClr val="000000">
+                <a:alpha val="70000"/>
+              </a:srgbClr>
+            </a:outerShdw>
+          </a:effectLst>
+        </p:spPr>
+      </p:pic>
+      <p:pic>
+        <p:nvPicPr>
+          <p:cNvPr id="156" name="CleanShot 2025-05-21 at 01.31.16@2x.png" descr="CleanShot 2025-05-21 at 01.31.16@2x.png"/>
+          <p:cNvPicPr>
+            <a:picLocks noChangeAspect="1"/>
+          </p:cNvPicPr>
+          <p:nvPr/>
+        </p:nvPicPr>
+        <p:blipFill>
+          <a:blip r:embed="rId3">
+            <a:extLst/>
+          </a:blip>
+          <a:stretch>
+            <a:fillRect/>
+          </a:stretch>
+        </p:blipFill>
+        <p:spPr>
+          <a:xfrm>
+            <a:off x="15229360" y="6198722"/>
+            <a:ext cx="6246340" cy="4673601"/>
+          </a:xfrm>
+          <a:prstGeom prst="rect">
+            <a:avLst/>
+          </a:prstGeom>
+          <a:ln w="25400">
+            <a:miter lim="400000"/>
+          </a:ln>
+          <a:effectLst>
+            <a:outerShdw sx="100000" sy="100000" kx="0" ky="0" algn="b" rotWithShape="0" blurRad="254000" dist="127000" dir="5400000">
+              <a:srgbClr val="000000">
+                <a:alpha val="70000"/>
+              </a:srgbClr>
+            </a:outerShdw>
+          </a:effectLst>
+        </p:spPr>
+      </p:pic>
+      <p:pic>
+        <p:nvPicPr>
+          <p:cNvPr id="157" name="CleanShot 2025-05-21 at 00.59.18@2x.png" descr="CleanShot 2025-05-21 at 00.59.18@2x.png"/>
+          <p:cNvPicPr>
+            <a:picLocks noChangeAspect="1"/>
+          </p:cNvPicPr>
+          <p:nvPr/>
+        </p:nvPicPr>
+        <p:blipFill>
+          <a:blip r:embed="rId4">
+            <a:extLst/>
+          </a:blip>
+          <a:srcRect l="0" t="0" r="0" b="0"/>
+          <a:stretch>
+            <a:fillRect/>
+          </a:stretch>
+        </p:blipFill>
+        <p:spPr>
+          <a:xfrm>
+            <a:off x="17751007" y="3124200"/>
+            <a:ext cx="6005898" cy="6270998"/>
+          </a:xfrm>
+          <a:prstGeom prst="rect">
+            <a:avLst/>
+          </a:prstGeom>
+          <a:ln w="25400">
+            <a:miter lim="400000"/>
+          </a:ln>
+          <a:effectLst>
+            <a:outerShdw sx="100000" sy="100000" kx="0" ky="0" algn="b" rotWithShape="0" blurRad="254000" dist="127000" dir="5400000">
+              <a:srgbClr val="000000">
+                <a:alpha val="70000"/>
+              </a:srgbClr>
+            </a:outerShdw>
+          </a:effectLst>
+        </p:spPr>
+      </p:pic>
     </p:spTree>
   </p:cSld>
   <p:clrMapOvr>
     <a:masterClrMapping/>
   </p:clrMapOvr>
-  <p:transition xmlns:p14="http://schemas.microsoft.com/office/powerpoint/2010/main" spd="med" advClick="1"/>
+  <mc:AlternateContent xmlns:mc="http://schemas.openxmlformats.org/markup-compatibility/2006">
+    <mc:Choice xmlns:p159="http://schemas.microsoft.com/office/powerpoint/2015/09/main" Requires="p159">
+      <p:transition xmlns:p14="http://schemas.microsoft.com/office/powerpoint/2010/main" spd="slow" advClick="1" p14:dur="2000">
+        <p159:morph option="byObject"/>
+      </p:transition>
+    </mc:Choice>
+    <mc:Fallback>
+      <p:transition spd="slow">
+        <p:fade/>
+      </p:transition>
+    </mc:Fallback>
+  </mc:AlternateContent>
 </p:sld>
 </file>
 
@@ -4592,7 +5599,7 @@
       </p:grpSpPr>
       <p:sp>
         <p:nvSpPr>
-          <p:cNvPr id="155" name="Použité technológie v projekte"/>
+          <p:cNvPr id="159" name="Použité technológie a nástroje"/>
           <p:cNvSpPr txBox="1"/>
           <p:nvPr>
             <p:ph type="title"/>
@@ -4609,20 +5616,24 @@
           <a:p>
             <a:pPr/>
             <a:r>
-              <a:t>Použité technológie v projekte</a:t>
+              <a:t>Použité technológie a nástroje</a:t>
             </a:r>
           </a:p>
         </p:txBody>
       </p:sp>
       <p:sp>
         <p:nvSpPr>
-          <p:cNvPr id="156" name="OctoberCMS: Nadstavba PHP frameworku Laravel.…"/>
+          <p:cNvPr id="160" name="OctoberCMS: Nadstavba PHP frameworku Laravel.…"/>
           <p:cNvSpPr txBox="1"/>
           <p:nvPr>
-            <p:ph type="body" idx="1"/>
+            <p:ph type="body" sz="half" idx="1"/>
           </p:nvPr>
         </p:nvSpPr>
         <p:spPr>
+          <a:xfrm>
+            <a:off x="1790700" y="3644900"/>
+            <a:ext cx="13919200" cy="8839200"/>
+          </a:xfrm>
           <a:prstGeom prst="rect">
             <a:avLst/>
           </a:prstGeom>
@@ -4638,7 +5649,16 @@
               <a:defRPr sz="4524"/>
             </a:pPr>
             <a:r>
-              <a:t>OctoberCMS: Nadstavba PHP frameworku Laravel.</a:t>
+              <a:rPr b="1">
+                <a:latin typeface="Helvetica"/>
+                <a:ea typeface="Helvetica"/>
+                <a:cs typeface="Helvetica"/>
+                <a:sym typeface="Helvetica"/>
+              </a:rPr>
+              <a:t>OctoberCMS</a:t>
+            </a:r>
+            <a:r>
+              <a:t>: Nadstavba PHP frameworku Laravel.</a:t>
             </a:r>
           </a:p>
           <a:p>
@@ -4649,7 +5669,16 @@
               <a:defRPr sz="4524"/>
             </a:pPr>
             <a:r>
-              <a:t>MySQL: Open-source relačná databáza.</a:t>
+              <a:rPr b="1">
+                <a:latin typeface="Helvetica"/>
+                <a:ea typeface="Helvetica"/>
+                <a:cs typeface="Helvetica"/>
+                <a:sym typeface="Helvetica"/>
+              </a:rPr>
+              <a:t>MySQL</a:t>
+            </a:r>
+            <a:r>
+              <a:t>: Open-source relačná databáza.</a:t>
             </a:r>
           </a:p>
           <a:p>
@@ -4660,7 +5689,16 @@
               <a:defRPr sz="4524"/>
             </a:pPr>
             <a:r>
-              <a:t>PHP a JavaScript: Vlastná logika systému.</a:t>
+              <a:rPr b="1">
+                <a:latin typeface="Helvetica"/>
+                <a:ea typeface="Helvetica"/>
+                <a:cs typeface="Helvetica"/>
+                <a:sym typeface="Helvetica"/>
+              </a:rPr>
+              <a:t>PHP a JavaScript</a:t>
+            </a:r>
+            <a:r>
+              <a:t>: Vlastná logika systému.</a:t>
             </a:r>
           </a:p>
           <a:p>
@@ -4671,7 +5709,16 @@
               <a:defRPr sz="4524"/>
             </a:pPr>
             <a:r>
-              <a:t>Git a GitHub: Verzionovanie kódu.</a:t>
+              <a:rPr b="1">
+                <a:latin typeface="Helvetica"/>
+                <a:ea typeface="Helvetica"/>
+                <a:cs typeface="Helvetica"/>
+                <a:sym typeface="Helvetica"/>
+              </a:rPr>
+              <a:t>Git a GitHub</a:t>
+            </a:r>
+            <a:r>
+              <a:t>: Verzionovanie kódu.</a:t>
             </a:r>
           </a:p>
           <a:p>
@@ -4682,7 +5729,16 @@
               <a:defRPr sz="4524"/>
             </a:pPr>
             <a:r>
-              <a:t>Postman: Testovanie REST API počas vývoja.</a:t>
+              <a:rPr b="1">
+                <a:latin typeface="Helvetica"/>
+                <a:ea typeface="Helvetica"/>
+                <a:cs typeface="Helvetica"/>
+                <a:sym typeface="Helvetica"/>
+              </a:rPr>
+              <a:t>Postman</a:t>
+            </a:r>
+            <a:r>
+              <a:t>: Testovanie REST API počas vývoja.</a:t>
             </a:r>
           </a:p>
           <a:p>
@@ -4693,7 +5749,16 @@
               <a:defRPr sz="4524"/>
             </a:pPr>
             <a:r>
-              <a:t>PhpStorm: Vývojové prostredie (IDE).</a:t>
+              <a:rPr b="1">
+                <a:latin typeface="Helvetica"/>
+                <a:ea typeface="Helvetica"/>
+                <a:cs typeface="Helvetica"/>
+                <a:sym typeface="Helvetica"/>
+              </a:rPr>
+              <a:t>PhpStorm</a:t>
+            </a:r>
+            <a:r>
+              <a:t>: Vývojové prostredie (IDE).</a:t>
             </a:r>
           </a:p>
           <a:p>
@@ -4704,17 +5769,289 @@
               <a:defRPr sz="4524"/>
             </a:pPr>
             <a:r>
-              <a:t>TablePlus: Nástroj na správu databázy.</a:t>
+              <a:rPr b="1">
+                <a:latin typeface="Helvetica"/>
+                <a:ea typeface="Helvetica"/>
+                <a:cs typeface="Helvetica"/>
+                <a:sym typeface="Helvetica"/>
+              </a:rPr>
+              <a:t>TablePlus</a:t>
+            </a:r>
+            <a:r>
+              <a:t>: Nástroj na správu databázy.</a:t>
             </a:r>
           </a:p>
         </p:txBody>
       </p:sp>
+      <p:pic>
+        <p:nvPicPr>
+          <p:cNvPr id="161" name="image.png" descr="image.png"/>
+          <p:cNvPicPr>
+            <a:picLocks noChangeAspect="1"/>
+          </p:cNvPicPr>
+          <p:nvPr/>
+        </p:nvPicPr>
+        <p:blipFill>
+          <a:blip r:embed="rId2">
+            <a:extLst/>
+          </a:blip>
+          <a:stretch>
+            <a:fillRect/>
+          </a:stretch>
+        </p:blipFill>
+        <p:spPr>
+          <a:xfrm>
+            <a:off x="17221200" y="3314700"/>
+            <a:ext cx="3162300" cy="3162300"/>
+          </a:xfrm>
+          <a:prstGeom prst="rect">
+            <a:avLst/>
+          </a:prstGeom>
+          <a:ln w="25400">
+            <a:miter lim="400000"/>
+          </a:ln>
+          <a:effectLst>
+            <a:outerShdw sx="100000" sy="100000" kx="0" ky="0" algn="b" rotWithShape="0" blurRad="254000" dist="127000" dir="5400000">
+              <a:srgbClr val="000000">
+                <a:alpha val="70000"/>
+              </a:srgbClr>
+            </a:outerShdw>
+          </a:effectLst>
+        </p:spPr>
+      </p:pic>
+      <p:pic>
+        <p:nvPicPr>
+          <p:cNvPr id="162" name="image.png" descr="image.png"/>
+          <p:cNvPicPr>
+            <a:picLocks noChangeAspect="1"/>
+          </p:cNvPicPr>
+          <p:nvPr/>
+        </p:nvPicPr>
+        <p:blipFill>
+          <a:blip r:embed="rId3">
+            <a:extLst/>
+          </a:blip>
+          <a:stretch>
+            <a:fillRect/>
+          </a:stretch>
+        </p:blipFill>
+        <p:spPr>
+          <a:xfrm>
+            <a:off x="20769978" y="3153608"/>
+            <a:ext cx="2889912" cy="4085392"/>
+          </a:xfrm>
+          <a:prstGeom prst="rect">
+            <a:avLst/>
+          </a:prstGeom>
+          <a:ln w="25400">
+            <a:miter lim="400000"/>
+          </a:ln>
+          <a:effectLst>
+            <a:outerShdw sx="100000" sy="100000" kx="0" ky="0" algn="b" rotWithShape="0" blurRad="254000" dist="127000" dir="5400000">
+              <a:srgbClr val="000000">
+                <a:alpha val="70000"/>
+              </a:srgbClr>
+            </a:outerShdw>
+          </a:effectLst>
+        </p:spPr>
+      </p:pic>
+      <p:pic>
+        <p:nvPicPr>
+          <p:cNvPr id="163" name="image.png" descr="image.png"/>
+          <p:cNvPicPr>
+            <a:picLocks noChangeAspect="1"/>
+          </p:cNvPicPr>
+          <p:nvPr/>
+        </p:nvPicPr>
+        <p:blipFill>
+          <a:blip r:embed="rId4">
+            <a:extLst/>
+          </a:blip>
+          <a:stretch>
+            <a:fillRect/>
+          </a:stretch>
+        </p:blipFill>
+        <p:spPr>
+          <a:xfrm>
+            <a:off x="13957300" y="7583646"/>
+            <a:ext cx="3708400" cy="2004855"/>
+          </a:xfrm>
+          <a:prstGeom prst="rect">
+            <a:avLst/>
+          </a:prstGeom>
+          <a:ln w="25400">
+            <a:miter lim="400000"/>
+          </a:ln>
+          <a:effectLst>
+            <a:outerShdw sx="100000" sy="100000" kx="0" ky="0" algn="b" rotWithShape="0" blurRad="254000" dist="127000" dir="5400000">
+              <a:srgbClr val="000000">
+                <a:alpha val="70000"/>
+              </a:srgbClr>
+            </a:outerShdw>
+          </a:effectLst>
+        </p:spPr>
+      </p:pic>
+      <p:pic>
+        <p:nvPicPr>
+          <p:cNvPr id="164" name="image.png" descr="image.png"/>
+          <p:cNvPicPr>
+            <a:picLocks noChangeAspect="1"/>
+          </p:cNvPicPr>
+          <p:nvPr/>
+        </p:nvPicPr>
+        <p:blipFill>
+          <a:blip r:embed="rId5">
+            <a:extLst/>
+          </a:blip>
+          <a:stretch>
+            <a:fillRect/>
+          </a:stretch>
+        </p:blipFill>
+        <p:spPr>
+          <a:xfrm>
+            <a:off x="13804900" y="4381500"/>
+            <a:ext cx="3200400" cy="3200400"/>
+          </a:xfrm>
+          <a:prstGeom prst="rect">
+            <a:avLst/>
+          </a:prstGeom>
+          <a:ln w="25400">
+            <a:miter lim="400000"/>
+          </a:ln>
+          <a:effectLst>
+            <a:outerShdw sx="100000" sy="100000" kx="0" ky="0" algn="b" rotWithShape="0" blurRad="254000" dist="127000" dir="5400000">
+              <a:srgbClr val="000000">
+                <a:alpha val="70000"/>
+              </a:srgbClr>
+            </a:outerShdw>
+          </a:effectLst>
+        </p:spPr>
+      </p:pic>
+      <p:pic>
+        <p:nvPicPr>
+          <p:cNvPr id="165" name="image.png" descr="image.png"/>
+          <p:cNvPicPr>
+            <a:picLocks noChangeAspect="1"/>
+          </p:cNvPicPr>
+          <p:nvPr/>
+        </p:nvPicPr>
+        <p:blipFill>
+          <a:blip r:embed="rId6">
+            <a:extLst/>
+          </a:blip>
+          <a:stretch>
+            <a:fillRect/>
+          </a:stretch>
+        </p:blipFill>
+        <p:spPr>
+          <a:xfrm>
+            <a:off x="14318876" y="10496665"/>
+            <a:ext cx="9347201" cy="2889135"/>
+          </a:xfrm>
+          <a:prstGeom prst="rect">
+            <a:avLst/>
+          </a:prstGeom>
+          <a:ln w="25400">
+            <a:miter lim="400000"/>
+          </a:ln>
+          <a:effectLst>
+            <a:outerShdw sx="100000" sy="100000" kx="0" ky="0" algn="b" rotWithShape="0" blurRad="254000" dist="127000" dir="5400000">
+              <a:srgbClr val="000000">
+                <a:alpha val="70000"/>
+              </a:srgbClr>
+            </a:outerShdw>
+          </a:effectLst>
+        </p:spPr>
+      </p:pic>
+      <p:pic>
+        <p:nvPicPr>
+          <p:cNvPr id="166" name="image.png" descr="image.png"/>
+          <p:cNvPicPr>
+            <a:picLocks noChangeAspect="1"/>
+          </p:cNvPicPr>
+          <p:nvPr/>
+        </p:nvPicPr>
+        <p:blipFill>
+          <a:blip r:embed="rId7">
+            <a:extLst/>
+          </a:blip>
+          <a:stretch>
+            <a:fillRect/>
+          </a:stretch>
+        </p:blipFill>
+        <p:spPr>
+          <a:xfrm>
+            <a:off x="18008600" y="7556500"/>
+            <a:ext cx="2540000" cy="2540000"/>
+          </a:xfrm>
+          <a:prstGeom prst="rect">
+            <a:avLst/>
+          </a:prstGeom>
+          <a:ln w="25400">
+            <a:miter lim="400000"/>
+          </a:ln>
+          <a:effectLst>
+            <a:outerShdw sx="100000" sy="100000" kx="0" ky="0" algn="b" rotWithShape="0" blurRad="254000" dist="127000" dir="5400000">
+              <a:srgbClr val="000000">
+                <a:alpha val="70000"/>
+              </a:srgbClr>
+            </a:outerShdw>
+          </a:effectLst>
+        </p:spPr>
+      </p:pic>
+      <p:pic>
+        <p:nvPicPr>
+          <p:cNvPr id="167" name="image.png" descr="image.png"/>
+          <p:cNvPicPr>
+            <a:picLocks noChangeAspect="1"/>
+          </p:cNvPicPr>
+          <p:nvPr/>
+        </p:nvPicPr>
+        <p:blipFill>
+          <a:blip r:embed="rId8">
+            <a:extLst/>
+          </a:blip>
+          <a:stretch>
+            <a:fillRect/>
+          </a:stretch>
+        </p:blipFill>
+        <p:spPr>
+          <a:xfrm>
+            <a:off x="20955000" y="7467600"/>
+            <a:ext cx="2705100" cy="2705100"/>
+          </a:xfrm>
+          <a:prstGeom prst="rect">
+            <a:avLst/>
+          </a:prstGeom>
+          <a:ln w="25400">
+            <a:miter lim="400000"/>
+          </a:ln>
+          <a:effectLst>
+            <a:outerShdw sx="100000" sy="100000" kx="0" ky="0" algn="b" rotWithShape="0" blurRad="254000" dist="127000" dir="5400000">
+              <a:srgbClr val="000000">
+                <a:alpha val="70000"/>
+              </a:srgbClr>
+            </a:outerShdw>
+          </a:effectLst>
+        </p:spPr>
+      </p:pic>
     </p:spTree>
   </p:cSld>
   <p:clrMapOvr>
     <a:masterClrMapping/>
   </p:clrMapOvr>
-  <p:transition xmlns:p14="http://schemas.microsoft.com/office/powerpoint/2010/main" spd="med" advClick="1"/>
+  <mc:AlternateContent xmlns:mc="http://schemas.openxmlformats.org/markup-compatibility/2006">
+    <mc:Choice xmlns:p159="http://schemas.microsoft.com/office/powerpoint/2015/09/main" Requires="p159">
+      <p:transition xmlns:p14="http://schemas.microsoft.com/office/powerpoint/2010/main" spd="slow" advClick="1" p14:dur="2000">
+        <p159:morph option="byObject"/>
+      </p:transition>
+    </mc:Choice>
+    <mc:Fallback>
+      <p:transition spd="slow">
+        <p:fade/>
+      </p:transition>
+    </mc:Fallback>
+  </mc:AlternateContent>
 </p:sld>
 </file>
 
@@ -4737,7 +6074,7 @@
       </p:grpSpPr>
       <p:sp>
         <p:nvSpPr>
-          <p:cNvPr id="158" name="Použité integrácie v projekte"/>
+          <p:cNvPr id="169" name="Použité integrácie"/>
           <p:cNvSpPr txBox="1"/>
           <p:nvPr>
             <p:ph type="title"/>
@@ -4754,20 +6091,24 @@
           <a:p>
             <a:pPr/>
             <a:r>
-              <a:t>Použité integrácie v projekte</a:t>
+              <a:t>Použité integrácie</a:t>
             </a:r>
           </a:p>
         </p:txBody>
       </p:sp>
       <p:sp>
         <p:nvSpPr>
-          <p:cNvPr id="159" name="Algolia AI Search - rýchle a inteligentné vyhľadávanie inzerátov.…"/>
+          <p:cNvPr id="170" name="Algolia AI Search: rýchle a inteligentné vyhľadávanie inzerátov.…"/>
           <p:cNvSpPr txBox="1"/>
           <p:nvPr>
             <p:ph type="body" idx="1"/>
           </p:nvPr>
         </p:nvSpPr>
         <p:spPr>
+          <a:xfrm>
+            <a:off x="1790700" y="3644900"/>
+            <a:ext cx="15621000" cy="8839200"/>
+          </a:xfrm>
           <a:prstGeom prst="rect">
             <a:avLst/>
           </a:prstGeom>
@@ -4776,68 +6117,360 @@
           <a:bodyPr/>
           <a:lstStyle/>
           <a:p>
-            <a:pPr marL="579119" indent="-579119" defTabSz="784225">
-              <a:spcBef>
-                <a:spcPts val="5600"/>
-              </a:spcBef>
-              <a:defRPr sz="4940"/>
+            <a:pPr marL="445008" indent="-445008" defTabSz="602615">
+              <a:spcBef>
+                <a:spcPts val="4300"/>
+              </a:spcBef>
+              <a:defRPr sz="3796"/>
             </a:pPr>
             <a:r>
-              <a:t>Algolia AI Search - rýchle a inteligentné vyhľadávanie inzerátov.</a:t>
-            </a:r>
-          </a:p>
-          <a:p>
-            <a:pPr marL="579119" indent="-579119" defTabSz="784225">
-              <a:spcBef>
-                <a:spcPts val="5600"/>
-              </a:spcBef>
-              <a:defRPr sz="4940"/>
+              <a:rPr b="1">
+                <a:latin typeface="Helvetica"/>
+                <a:ea typeface="Helvetica"/>
+                <a:cs typeface="Helvetica"/>
+                <a:sym typeface="Helvetica"/>
+              </a:rPr>
+              <a:t>Algolia AI Search</a:t>
+            </a:r>
+            <a:r>
+              <a:t>: rýchle a inteligentné vyhľadávanie inzerátov.</a:t>
+            </a:r>
+          </a:p>
+          <a:p>
+            <a:pPr marL="445008" indent="-445008" defTabSz="602615">
+              <a:spcBef>
+                <a:spcPts val="4300"/>
+              </a:spcBef>
+              <a:defRPr sz="3796"/>
             </a:pPr>
             <a:r>
-              <a:t>OpenAI API - automatické generovanie textov k inzerátom na základe zadaných parametrov vozidla.</a:t>
-            </a:r>
-          </a:p>
-          <a:p>
-            <a:pPr marL="579119" indent="-579119" defTabSz="784225">
-              <a:spcBef>
-                <a:spcPts val="5600"/>
-              </a:spcBef>
-              <a:defRPr sz="4940"/>
+              <a:rPr b="1">
+                <a:latin typeface="Helvetica"/>
+                <a:ea typeface="Helvetica"/>
+                <a:cs typeface="Helvetica"/>
+                <a:sym typeface="Helvetica"/>
+              </a:rPr>
+              <a:t>OpenAI API</a:t>
+            </a:r>
+            <a:r>
+              <a:t>: generovanie popisov k inzerátom na základe zadaných parametrov vozidla a online diagnostika vozidiel.</a:t>
+            </a:r>
+          </a:p>
+          <a:p>
+            <a:pPr marL="445008" indent="-445008" defTabSz="602615">
+              <a:spcBef>
+                <a:spcPts val="4300"/>
+              </a:spcBef>
+              <a:defRPr sz="3796"/>
             </a:pPr>
             <a:r>
-              <a:t>Google Cloud API - lokalizácia inzerátov a prihlásenie cez Google účet.</a:t>
-            </a:r>
-          </a:p>
-          <a:p>
-            <a:pPr marL="579119" indent="-579119" defTabSz="784225">
-              <a:spcBef>
-                <a:spcPts val="5600"/>
-              </a:spcBef>
-              <a:defRPr sz="4940"/>
+              <a:rPr b="1">
+                <a:latin typeface="Helvetica"/>
+                <a:ea typeface="Helvetica"/>
+                <a:cs typeface="Helvetica"/>
+                <a:sym typeface="Helvetica"/>
+              </a:rPr>
+              <a:t>Stripe API</a:t>
+            </a:r>
+            <a:r>
+              <a:t>: platobná brána na spracovanie online platieb za prémiové predplatné služby.</a:t>
+            </a:r>
+          </a:p>
+          <a:p>
+            <a:pPr marL="445008" indent="-445008" defTabSz="602615">
+              <a:spcBef>
+                <a:spcPts val="4300"/>
+              </a:spcBef>
+              <a:defRPr sz="3796"/>
             </a:pPr>
             <a:r>
-              <a:t>BugSnag - analytiky, pomáha sledovať chyby aplikácie v reálnom čase.</a:t>
-            </a:r>
-          </a:p>
-          <a:p>
-            <a:pPr marL="579119" indent="-579119" defTabSz="784225">
-              <a:spcBef>
-                <a:spcPts val="5600"/>
-              </a:spcBef>
-              <a:defRPr sz="4940"/>
+              <a:rPr b="1">
+                <a:latin typeface="Helvetica"/>
+                <a:ea typeface="Helvetica"/>
+                <a:cs typeface="Helvetica"/>
+                <a:sym typeface="Helvetica"/>
+              </a:rPr>
+              <a:t>Google Cloud API</a:t>
+            </a:r>
+            <a:r>
+              <a:t>: lokalizácia inzerátov a používateľov a prihlásenie cez Google účet.</a:t>
+            </a:r>
+          </a:p>
+          <a:p>
+            <a:pPr marL="445008" indent="-445008" defTabSz="602615">
+              <a:spcBef>
+                <a:spcPts val="4300"/>
+              </a:spcBef>
+              <a:defRPr sz="3796"/>
             </a:pPr>
             <a:r>
-              <a:t>Mailjet - rozosielanie noviniek formou newsletterov.</a:t>
+              <a:rPr b="1">
+                <a:latin typeface="Helvetica"/>
+                <a:ea typeface="Helvetica"/>
+                <a:cs typeface="Helvetica"/>
+                <a:sym typeface="Helvetica"/>
+              </a:rPr>
+              <a:t>BugSnag</a:t>
+            </a:r>
+            <a:r>
+              <a:t>: analytiky, pomáha sledovať chyby aplikácie v reálnom čase.</a:t>
+            </a:r>
+          </a:p>
+          <a:p>
+            <a:pPr marL="445008" indent="-445008" defTabSz="602615">
+              <a:spcBef>
+                <a:spcPts val="4300"/>
+              </a:spcBef>
+              <a:defRPr sz="3796"/>
+            </a:pPr>
+            <a:r>
+              <a:rPr b="1">
+                <a:latin typeface="Helvetica"/>
+                <a:ea typeface="Helvetica"/>
+                <a:cs typeface="Helvetica"/>
+                <a:sym typeface="Helvetica"/>
+              </a:rPr>
+              <a:t>Mailjet</a:t>
+            </a:r>
+            <a:r>
+              <a:t>: rozosielanie noviniek formou newsletterov.</a:t>
             </a:r>
           </a:p>
         </p:txBody>
       </p:sp>
+      <p:pic>
+        <p:nvPicPr>
+          <p:cNvPr id="171" name="image.png" descr="image.png"/>
+          <p:cNvPicPr>
+            <a:picLocks noChangeAspect="1"/>
+          </p:cNvPicPr>
+          <p:nvPr/>
+        </p:nvPicPr>
+        <p:blipFill>
+          <a:blip r:embed="rId2">
+            <a:extLst/>
+          </a:blip>
+          <a:stretch>
+            <a:fillRect/>
+          </a:stretch>
+        </p:blipFill>
+        <p:spPr>
+          <a:xfrm>
+            <a:off x="17995900" y="3270250"/>
+            <a:ext cx="5295900" cy="2647950"/>
+          </a:xfrm>
+          <a:prstGeom prst="rect">
+            <a:avLst/>
+          </a:prstGeom>
+          <a:ln w="25400">
+            <a:miter lim="400000"/>
+          </a:ln>
+          <a:effectLst>
+            <a:outerShdw sx="100000" sy="100000" kx="0" ky="0" algn="b" rotWithShape="0" blurRad="254000" dist="127000" dir="5400000">
+              <a:srgbClr val="000000">
+                <a:alpha val="70000"/>
+              </a:srgbClr>
+            </a:outerShdw>
+          </a:effectLst>
+        </p:spPr>
+      </p:pic>
+      <p:pic>
+        <p:nvPicPr>
+          <p:cNvPr id="172" name="image.png" descr="image.png"/>
+          <p:cNvPicPr>
+            <a:picLocks noChangeAspect="1"/>
+          </p:cNvPicPr>
+          <p:nvPr/>
+        </p:nvPicPr>
+        <p:blipFill>
+          <a:blip r:embed="rId3">
+            <a:extLst/>
+          </a:blip>
+          <a:stretch>
+            <a:fillRect/>
+          </a:stretch>
+        </p:blipFill>
+        <p:spPr>
+          <a:xfrm>
+            <a:off x="18569213" y="9144793"/>
+            <a:ext cx="4155925" cy="2727326"/>
+          </a:xfrm>
+          <a:prstGeom prst="rect">
+            <a:avLst/>
+          </a:prstGeom>
+          <a:ln w="25400">
+            <a:miter lim="400000"/>
+          </a:ln>
+          <a:effectLst>
+            <a:outerShdw sx="100000" sy="100000" kx="0" ky="0" algn="b" rotWithShape="0" blurRad="254000" dist="127000" dir="5400000">
+              <a:srgbClr val="000000">
+                <a:alpha val="70000"/>
+              </a:srgbClr>
+            </a:outerShdw>
+          </a:effectLst>
+        </p:spPr>
+      </p:pic>
+      <p:pic>
+        <p:nvPicPr>
+          <p:cNvPr id="173" name="image.png" descr="image.png"/>
+          <p:cNvPicPr>
+            <a:picLocks noChangeAspect="1"/>
+          </p:cNvPicPr>
+          <p:nvPr/>
+        </p:nvPicPr>
+        <p:blipFill>
+          <a:blip r:embed="rId4">
+            <a:extLst/>
+          </a:blip>
+          <a:stretch>
+            <a:fillRect/>
+          </a:stretch>
+        </p:blipFill>
+        <p:spPr>
+          <a:xfrm>
+            <a:off x="21082000" y="6184900"/>
+            <a:ext cx="2692400" cy="2692400"/>
+          </a:xfrm>
+          <a:prstGeom prst="rect">
+            <a:avLst/>
+          </a:prstGeom>
+          <a:ln w="25400">
+            <a:miter lim="400000"/>
+          </a:ln>
+          <a:effectLst>
+            <a:outerShdw sx="100000" sy="100000" kx="0" ky="0" algn="b" rotWithShape="0" blurRad="254000" dist="127000" dir="5400000">
+              <a:srgbClr val="000000">
+                <a:alpha val="70000"/>
+              </a:srgbClr>
+            </a:outerShdw>
+          </a:effectLst>
+        </p:spPr>
+      </p:pic>
+      <p:pic>
+        <p:nvPicPr>
+          <p:cNvPr id="174" name="image.png" descr="image.png"/>
+          <p:cNvPicPr>
+            <a:picLocks noChangeAspect="1"/>
+          </p:cNvPicPr>
+          <p:nvPr/>
+        </p:nvPicPr>
+        <p:blipFill>
+          <a:blip r:embed="rId5">
+            <a:extLst/>
+          </a:blip>
+          <a:stretch>
+            <a:fillRect/>
+          </a:stretch>
+        </p:blipFill>
+        <p:spPr>
+          <a:xfrm>
+            <a:off x="17411700" y="6070600"/>
+            <a:ext cx="2933700" cy="2933700"/>
+          </a:xfrm>
+          <a:prstGeom prst="rect">
+            <a:avLst/>
+          </a:prstGeom>
+          <a:ln w="25400">
+            <a:miter lim="400000"/>
+          </a:ln>
+          <a:effectLst>
+            <a:outerShdw sx="100000" sy="100000" kx="0" ky="0" algn="b" rotWithShape="0" blurRad="254000" dist="127000" dir="5400000">
+              <a:srgbClr val="000000">
+                <a:alpha val="70000"/>
+              </a:srgbClr>
+            </a:outerShdw>
+          </a:effectLst>
+        </p:spPr>
+      </p:pic>
+      <p:pic>
+        <p:nvPicPr>
+          <p:cNvPr id="175" name="image.png" descr="image.png"/>
+          <p:cNvPicPr>
+            <a:picLocks noChangeAspect="1"/>
+          </p:cNvPicPr>
+          <p:nvPr/>
+        </p:nvPicPr>
+        <p:blipFill>
+          <a:blip r:embed="rId6">
+            <a:extLst/>
+          </a:blip>
+          <a:stretch>
+            <a:fillRect/>
+          </a:stretch>
+        </p:blipFill>
+        <p:spPr>
+          <a:xfrm>
+            <a:off x="16649700" y="12138931"/>
+            <a:ext cx="7124700" cy="1272269"/>
+          </a:xfrm>
+          <a:prstGeom prst="rect">
+            <a:avLst/>
+          </a:prstGeom>
+          <a:ln w="25400">
+            <a:miter lim="400000"/>
+          </a:ln>
+          <a:effectLst>
+            <a:outerShdw sx="100000" sy="100000" kx="0" ky="0" algn="b" rotWithShape="0" blurRad="254000" dist="127000" dir="5400000">
+              <a:srgbClr val="000000">
+                <a:alpha val="70000"/>
+              </a:srgbClr>
+            </a:outerShdw>
+          </a:effectLst>
+        </p:spPr>
+      </p:pic>
+      <p:pic>
+        <p:nvPicPr>
+          <p:cNvPr id="176" name="image.png" descr="image.png"/>
+          <p:cNvPicPr>
+            <a:picLocks noChangeAspect="1"/>
+          </p:cNvPicPr>
+          <p:nvPr/>
+        </p:nvPicPr>
+        <p:blipFill>
+          <a:blip r:embed="rId7">
+            <a:extLst/>
+          </a:blip>
+          <a:stretch>
+            <a:fillRect/>
+          </a:stretch>
+        </p:blipFill>
+        <p:spPr>
+          <a:xfrm>
+            <a:off x="14097000" y="11277600"/>
+            <a:ext cx="2133600" cy="2133600"/>
+          </a:xfrm>
+          <a:prstGeom prst="rect">
+            <a:avLst/>
+          </a:prstGeom>
+          <a:ln w="25400">
+            <a:miter lim="400000"/>
+          </a:ln>
+          <a:effectLst>
+            <a:outerShdw sx="100000" sy="100000" kx="0" ky="0" algn="b" rotWithShape="0" blurRad="254000" dist="127000" dir="5400000">
+              <a:srgbClr val="000000">
+                <a:alpha val="70000"/>
+              </a:srgbClr>
+            </a:outerShdw>
+          </a:effectLst>
+        </p:spPr>
+      </p:pic>
     </p:spTree>
   </p:cSld>
   <p:clrMapOvr>
     <a:masterClrMapping/>
   </p:clrMapOvr>
-  <p:transition xmlns:p14="http://schemas.microsoft.com/office/powerpoint/2010/main" spd="med" advClick="1"/>
+  <mc:AlternateContent xmlns:mc="http://schemas.openxmlformats.org/markup-compatibility/2006">
+    <mc:Choice xmlns:p159="http://schemas.microsoft.com/office/powerpoint/2015/09/main" Requires="p159">
+      <p:transition xmlns:p14="http://schemas.microsoft.com/office/powerpoint/2010/main" spd="slow" advClick="1" p14:dur="2000">
+        <p159:morph option="byObject"/>
+      </p:transition>
+    </mc:Choice>
+    <mc:Fallback>
+      <p:transition spd="slow">
+        <p:fade/>
+      </p:transition>
+    </mc:Fallback>
+  </mc:AlternateContent>
 </p:sld>
 </file>
 
@@ -4860,7 +6493,7 @@
       </p:grpSpPr>
       <p:sp>
         <p:nvSpPr>
-          <p:cNvPr id="161" name="Architektúra zdrojového kódu projektu"/>
+          <p:cNvPr id="178" name="Architektúra zdrojového kódu"/>
           <p:cNvSpPr txBox="1"/>
           <p:nvPr>
             <p:ph type="title"/>
@@ -4873,28 +6506,28 @@
         </p:spPr>
         <p:txBody>
           <a:bodyPr/>
-          <a:lstStyle>
-            <a:lvl1pPr defTabSz="701675">
-              <a:defRPr sz="9520"/>
-            </a:lvl1pPr>
-          </a:lstStyle>
+          <a:lstStyle/>
           <a:p>
             <a:pPr/>
             <a:r>
-              <a:t>Architektúra zdrojového kódu projektu</a:t>
+              <a:t>Architektúra zdrojového kódu</a:t>
             </a:r>
           </a:p>
         </p:txBody>
       </p:sp>
       <p:sp>
         <p:nvSpPr>
-          <p:cNvPr id="162" name="Využil som pluginovú architektúru OctoberCMS - jednotlivé časti ako inzeráty či komentáre majú vlastné moduly.…"/>
+          <p:cNvPr id="179" name="Využil som pluginovú architektúru OctoberCMS - jednotlivé časti ako inzeráty či komentáre majú vlastné moduly.…"/>
           <p:cNvSpPr txBox="1"/>
           <p:nvPr>
             <p:ph type="body" idx="1"/>
           </p:nvPr>
         </p:nvSpPr>
         <p:spPr>
+          <a:xfrm>
+            <a:off x="1790700" y="3644900"/>
+            <a:ext cx="15786100" cy="8839200"/>
+          </a:xfrm>
           <a:prstGeom prst="rect">
             <a:avLst/>
           </a:prstGeom>
@@ -4903,37 +6536,202 @@
           <a:bodyPr/>
           <a:lstStyle/>
           <a:p>
-            <a:pPr/>
-            <a:r>
-              <a:t>Využil som pluginovú architektúru OctoberCMS - jednotlivé časti ako inzeráty či komentáre majú vlastné moduly.</a:t>
-            </a:r>
-          </a:p>
-          <a:p>
-            <a:pPr/>
-            <a:r>
-              <a:t>API je navrhnuté podľa REST princípov a podporuje všetky CRUD operácie.</a:t>
-            </a:r>
-          </a:p>
-          <a:p>
-            <a:pPr/>
-            <a:r>
-              <a:t>Implementoval som JWT autentifikáciu používateľov, ktorá zabezpečuje overenie identity a bezpečný prístup k dátam.</a:t>
-            </a:r>
-          </a:p>
-          <a:p>
-            <a:pPr/>
-            <a:r>
-              <a:t>Na ukladanie súborov (napr. obrázky vozidiel) som využil cloudové úložisko AWS S3.</a:t>
+            <a:pPr marL="524255" indent="-524255" defTabSz="709930">
+              <a:spcBef>
+                <a:spcPts val="5000"/>
+              </a:spcBef>
+              <a:defRPr sz="4472"/>
+            </a:pPr>
+            <a:r>
+              <a:t>Využil som </a:t>
+            </a:r>
+            <a:r>
+              <a:rPr b="1">
+                <a:latin typeface="Helvetica"/>
+                <a:ea typeface="Helvetica"/>
+                <a:cs typeface="Helvetica"/>
+                <a:sym typeface="Helvetica"/>
+              </a:rPr>
+              <a:t>pluginovú architektúru</a:t>
+            </a:r>
+            <a:r>
+              <a:t> OctoberCMS - jednotlivé časti ako inzeráty či komentáre majú vlastné moduly.</a:t>
+            </a:r>
+          </a:p>
+          <a:p>
+            <a:pPr marL="524255" indent="-524255" defTabSz="709930">
+              <a:spcBef>
+                <a:spcPts val="5000"/>
+              </a:spcBef>
+              <a:defRPr sz="4472"/>
+            </a:pPr>
+            <a:r>
+              <a:t>API je navrhnuté podľa </a:t>
+            </a:r>
+            <a:r>
+              <a:rPr b="1">
+                <a:latin typeface="Helvetica"/>
+                <a:ea typeface="Helvetica"/>
+                <a:cs typeface="Helvetica"/>
+                <a:sym typeface="Helvetica"/>
+              </a:rPr>
+              <a:t>REST</a:t>
+            </a:r>
+            <a:r>
+              <a:t> princípov a podporuje všetky </a:t>
+            </a:r>
+            <a:r>
+              <a:rPr b="1">
+                <a:latin typeface="Helvetica"/>
+                <a:ea typeface="Helvetica"/>
+                <a:cs typeface="Helvetica"/>
+                <a:sym typeface="Helvetica"/>
+              </a:rPr>
+              <a:t>CRUD</a:t>
+            </a:r>
+            <a:r>
+              <a:t> operácie.</a:t>
+            </a:r>
+          </a:p>
+          <a:p>
+            <a:pPr marL="524255" indent="-524255" defTabSz="709930">
+              <a:spcBef>
+                <a:spcPts val="5000"/>
+              </a:spcBef>
+              <a:defRPr sz="4472"/>
+            </a:pPr>
+            <a:r>
+              <a:t>Implementoval som </a:t>
+            </a:r>
+            <a:r>
+              <a:rPr b="1">
+                <a:latin typeface="Helvetica"/>
+                <a:ea typeface="Helvetica"/>
+                <a:cs typeface="Helvetica"/>
+                <a:sym typeface="Helvetica"/>
+              </a:rPr>
+              <a:t>JWT autentifikáciu</a:t>
+            </a:r>
+            <a:r>
+              <a:t> používateľov, ktorá zabezpečuje overenie identity a bezpečný prístup k dátam.</a:t>
+            </a:r>
+          </a:p>
+          <a:p>
+            <a:pPr marL="524255" indent="-524255" defTabSz="709930">
+              <a:spcBef>
+                <a:spcPts val="5000"/>
+              </a:spcBef>
+              <a:defRPr sz="4472"/>
+            </a:pPr>
+            <a:r>
+              <a:t>Na ukladanie súborov (napr. obrázky vozidiel) som využil cloudové úložisko </a:t>
+            </a:r>
+            <a:r>
+              <a:rPr b="1">
+                <a:latin typeface="Helvetica"/>
+                <a:ea typeface="Helvetica"/>
+                <a:cs typeface="Helvetica"/>
+                <a:sym typeface="Helvetica"/>
+              </a:rPr>
+              <a:t>AWS S3</a:t>
+            </a:r>
+            <a:r>
+              <a:t>.</a:t>
             </a:r>
           </a:p>
         </p:txBody>
       </p:sp>
+      <p:pic>
+        <p:nvPicPr>
+          <p:cNvPr id="180" name="CleanShot 2025-05-21 at 01.22.16@2x.png" descr="CleanShot 2025-05-21 at 01.22.16@2x.png"/>
+          <p:cNvPicPr>
+            <a:picLocks noChangeAspect="1"/>
+          </p:cNvPicPr>
+          <p:nvPr/>
+        </p:nvPicPr>
+        <p:blipFill>
+          <a:blip r:embed="rId2">
+            <a:extLst/>
+          </a:blip>
+          <a:srcRect l="0" t="0" r="75" b="15233"/>
+          <a:stretch>
+            <a:fillRect/>
+          </a:stretch>
+        </p:blipFill>
+        <p:spPr>
+          <a:xfrm>
+            <a:off x="18298572" y="3497538"/>
+            <a:ext cx="5196142" cy="9690101"/>
+          </a:xfrm>
+          <a:prstGeom prst="rect">
+            <a:avLst/>
+          </a:prstGeom>
+          <a:ln w="25400">
+            <a:miter lim="400000"/>
+          </a:ln>
+          <a:effectLst>
+            <a:outerShdw sx="100000" sy="100000" kx="0" ky="0" algn="b" rotWithShape="0" blurRad="254000" dist="127000" dir="5400000">
+              <a:srgbClr val="000000">
+                <a:alpha val="70000"/>
+              </a:srgbClr>
+            </a:outerShdw>
+          </a:effectLst>
+        </p:spPr>
+      </p:pic>
+      <p:pic>
+        <p:nvPicPr>
+          <p:cNvPr id="181" name="image.png" descr="image.png"/>
+          <p:cNvPicPr>
+            <a:picLocks noChangeAspect="1"/>
+          </p:cNvPicPr>
+          <p:nvPr/>
+        </p:nvPicPr>
+        <p:blipFill>
+          <a:blip r:embed="rId3">
+            <a:extLst/>
+          </a:blip>
+          <a:srcRect l="0" t="0" r="0" b="0"/>
+          <a:stretch>
+            <a:fillRect/>
+          </a:stretch>
+        </p:blipFill>
+        <p:spPr>
+          <a:xfrm>
+            <a:off x="12187092" y="11597685"/>
+            <a:ext cx="4711000" cy="1584915"/>
+          </a:xfrm>
+          <a:prstGeom prst="rect">
+            <a:avLst/>
+          </a:prstGeom>
+          <a:ln w="25400">
+            <a:miter lim="400000"/>
+          </a:ln>
+          <a:effectLst>
+            <a:outerShdw sx="100000" sy="100000" kx="0" ky="0" algn="b" rotWithShape="0" blurRad="254000" dist="127000" dir="5400000">
+              <a:srgbClr val="000000">
+                <a:alpha val="70000"/>
+              </a:srgbClr>
+            </a:outerShdw>
+          </a:effectLst>
+        </p:spPr>
+      </p:pic>
     </p:spTree>
   </p:cSld>
   <p:clrMapOvr>
     <a:masterClrMapping/>
   </p:clrMapOvr>
-  <p:transition xmlns:p14="http://schemas.microsoft.com/office/powerpoint/2010/main" spd="med" advClick="1"/>
+  <mc:AlternateContent xmlns:mc="http://schemas.openxmlformats.org/markup-compatibility/2006">
+    <mc:Choice xmlns:p159="http://schemas.microsoft.com/office/powerpoint/2015/09/main" Requires="p159">
+      <p:transition xmlns:p14="http://schemas.microsoft.com/office/powerpoint/2010/main" spd="slow" advClick="1" p14:dur="2000">
+        <p159:morph option="byObject"/>
+      </p:transition>
+    </mc:Choice>
+    <mc:Fallback>
+      <p:transition spd="slow">
+        <p:fade/>
+      </p:transition>
+    </mc:Fallback>
+  </mc:AlternateContent>
 </p:sld>
 </file>
 
@@ -4956,7 +6754,7 @@
       </p:grpSpPr>
       <p:sp>
         <p:nvSpPr>
-          <p:cNvPr id="164" name="Zverejnenie projektu na doménu a proces nasadenia na server"/>
+          <p:cNvPr id="183" name="Zverejnenie na doménu a proces nasadenia na server"/>
           <p:cNvSpPr txBox="1"/>
           <p:nvPr>
             <p:ph type="title"/>
@@ -4977,20 +6775,24 @@
           <a:p>
             <a:pPr/>
             <a:r>
-              <a:t>Zverejnenie projektu na doménu a proces nasadenia na server</a:t>
+              <a:t>Zverejnenie na doménu a proces nasadenia na server</a:t>
             </a:r>
           </a:p>
         </p:txBody>
       </p:sp>
       <p:sp>
         <p:nvSpPr>
-          <p:cNvPr id="165" name="Projekt som nasadil na VPS server s Ubuntu 20.04 a webserverom Apache HTTP Server, pričom hosting beží na službe AWS Lightsail.…"/>
+          <p:cNvPr id="184" name="Projekt som nasadil na VPS server s Ubuntu 20.04 a webserverom Apache HTTP Server, pričom hosting beží na službe AWS Lightsail.…"/>
           <p:cNvSpPr txBox="1"/>
           <p:nvPr>
-            <p:ph type="body" idx="1"/>
+            <p:ph type="body" sz="half" idx="1"/>
           </p:nvPr>
         </p:nvSpPr>
         <p:spPr>
+          <a:xfrm>
+            <a:off x="1790700" y="3644900"/>
+            <a:ext cx="14312900" cy="8839200"/>
+          </a:xfrm>
           <a:prstGeom prst="rect">
             <a:avLst/>
           </a:prstGeom>
@@ -4999,31 +6801,273 @@
           <a:bodyPr/>
           <a:lstStyle/>
           <a:p>
-            <a:pPr/>
-            <a:r>
-              <a:t>Projekt som nasadil na VPS server s Ubuntu 20.04 a webserverom Apache HTTP Server, pričom hosting beží na službe AWS Lightsail.</a:t>
-            </a:r>
-          </a:p>
-          <a:p>
-            <a:pPr/>
-            <a:r>
-              <a:t>Doménu autobahn.sk som zaregistroval na službe Websupport a pomocou DNS záznamov som ju nasmeroval na verejnú IP adresu môjho servera.</a:t>
-            </a:r>
-          </a:p>
-          <a:p>
-            <a:pPr/>
-            <a:r>
-              <a:t>Aplikáciu som zabezpečil na strane servera SSL certifikátom pomocou služby Let's Encrypt, takže používame HTTPS protokol.</a:t>
+            <a:pPr marL="560831" indent="-560831" defTabSz="759459">
+              <a:spcBef>
+                <a:spcPts val="5400"/>
+              </a:spcBef>
+              <a:defRPr sz="4784"/>
+            </a:pPr>
+            <a:r>
+              <a:t>Projekt som nasadil na VPS server s </a:t>
+            </a:r>
+            <a:r>
+              <a:rPr b="1">
+                <a:latin typeface="Helvetica"/>
+                <a:ea typeface="Helvetica"/>
+                <a:cs typeface="Helvetica"/>
+                <a:sym typeface="Helvetica"/>
+              </a:rPr>
+              <a:t>Ubuntu 20.04</a:t>
+            </a:r>
+            <a:r>
+              <a:t> a webserverom </a:t>
+            </a:r>
+            <a:r>
+              <a:rPr b="1">
+                <a:latin typeface="Helvetica"/>
+                <a:ea typeface="Helvetica"/>
+                <a:cs typeface="Helvetica"/>
+                <a:sym typeface="Helvetica"/>
+              </a:rPr>
+              <a:t>Apache HTTP Server</a:t>
+            </a:r>
+            <a:r>
+              <a:t>, pričom hosting beží na službe </a:t>
+            </a:r>
+            <a:r>
+              <a:rPr b="1">
+                <a:latin typeface="Helvetica"/>
+                <a:ea typeface="Helvetica"/>
+                <a:cs typeface="Helvetica"/>
+                <a:sym typeface="Helvetica"/>
+              </a:rPr>
+              <a:t>AWS Lightsail</a:t>
+            </a:r>
+            <a:r>
+              <a:t>.</a:t>
+            </a:r>
+          </a:p>
+          <a:p>
+            <a:pPr marL="560831" indent="-560831" defTabSz="759459">
+              <a:spcBef>
+                <a:spcPts val="5400"/>
+              </a:spcBef>
+              <a:defRPr sz="4784"/>
+            </a:pPr>
+            <a:r>
+              <a:t>Doménu autobahn.sk som zaregistroval na službe </a:t>
+            </a:r>
+            <a:r>
+              <a:rPr b="1">
+                <a:latin typeface="Helvetica"/>
+                <a:ea typeface="Helvetica"/>
+                <a:cs typeface="Helvetica"/>
+                <a:sym typeface="Helvetica"/>
+              </a:rPr>
+              <a:t>Websupport</a:t>
+            </a:r>
+            <a:r>
+              <a:t> a pomocou </a:t>
+            </a:r>
+            <a:r>
+              <a:rPr b="1">
+                <a:latin typeface="Helvetica"/>
+                <a:ea typeface="Helvetica"/>
+                <a:cs typeface="Helvetica"/>
+                <a:sym typeface="Helvetica"/>
+              </a:rPr>
+              <a:t>DNS záznamov</a:t>
+            </a:r>
+            <a:r>
+              <a:t> som ju nasmeroval na verejnú </a:t>
+            </a:r>
+            <a:r>
+              <a:rPr b="1">
+                <a:latin typeface="Helvetica"/>
+                <a:ea typeface="Helvetica"/>
+                <a:cs typeface="Helvetica"/>
+                <a:sym typeface="Helvetica"/>
+              </a:rPr>
+              <a:t>IP adresu</a:t>
+            </a:r>
+            <a:r>
+              <a:t> môjho servera.</a:t>
+            </a:r>
+          </a:p>
+          <a:p>
+            <a:pPr marL="560831" indent="-560831" defTabSz="759459">
+              <a:spcBef>
+                <a:spcPts val="5400"/>
+              </a:spcBef>
+              <a:defRPr sz="4784"/>
+            </a:pPr>
+            <a:r>
+              <a:t>Aplikáciu som zabezpečil na strane servera </a:t>
+            </a:r>
+            <a:r>
+              <a:rPr b="1">
+                <a:latin typeface="Helvetica"/>
+                <a:ea typeface="Helvetica"/>
+                <a:cs typeface="Helvetica"/>
+                <a:sym typeface="Helvetica"/>
+              </a:rPr>
+              <a:t>SSL certifikátom</a:t>
+            </a:r>
+            <a:r>
+              <a:t> pomocou služby </a:t>
+            </a:r>
+            <a:r>
+              <a:rPr b="1">
+                <a:latin typeface="Helvetica"/>
+                <a:ea typeface="Helvetica"/>
+                <a:cs typeface="Helvetica"/>
+                <a:sym typeface="Helvetica"/>
+              </a:rPr>
+              <a:t>Let's Encrypt</a:t>
+            </a:r>
+            <a:r>
+              <a:t>, takže používame </a:t>
+            </a:r>
+            <a:r>
+              <a:rPr b="1">
+                <a:latin typeface="Helvetica"/>
+                <a:ea typeface="Helvetica"/>
+                <a:cs typeface="Helvetica"/>
+                <a:sym typeface="Helvetica"/>
+              </a:rPr>
+              <a:t>HTTPS protokol</a:t>
+            </a:r>
+            <a:r>
+              <a:t>.</a:t>
             </a:r>
           </a:p>
         </p:txBody>
       </p:sp>
+      <p:pic>
+        <p:nvPicPr>
+          <p:cNvPr id="185" name="image.png" descr="image.png"/>
+          <p:cNvPicPr>
+            <a:picLocks noChangeAspect="1"/>
+          </p:cNvPicPr>
+          <p:nvPr/>
+        </p:nvPicPr>
+        <p:blipFill>
+          <a:blip r:embed="rId2">
+            <a:extLst/>
+          </a:blip>
+          <a:stretch>
+            <a:fillRect/>
+          </a:stretch>
+        </p:blipFill>
+        <p:spPr>
+          <a:xfrm>
+            <a:off x="17741900" y="3644900"/>
+            <a:ext cx="5499100" cy="2616200"/>
+          </a:xfrm>
+          <a:prstGeom prst="rect">
+            <a:avLst/>
+          </a:prstGeom>
+          <a:ln w="25400">
+            <a:miter lim="400000"/>
+          </a:ln>
+          <a:effectLst>
+            <a:outerShdw sx="100000" sy="100000" kx="0" ky="0" algn="b" rotWithShape="0" blurRad="254000" dist="127000" dir="5400000">
+              <a:srgbClr val="000000">
+                <a:alpha val="70000"/>
+              </a:srgbClr>
+            </a:outerShdw>
+          </a:effectLst>
+        </p:spPr>
+      </p:pic>
+      <p:pic>
+        <p:nvPicPr>
+          <p:cNvPr id="186" name="image.png" descr="image.png"/>
+          <p:cNvPicPr>
+            <a:picLocks noChangeAspect="1"/>
+          </p:cNvPicPr>
+          <p:nvPr/>
+        </p:nvPicPr>
+        <p:blipFill>
+          <a:blip r:embed="rId3">
+            <a:extLst/>
+          </a:blip>
+          <a:stretch>
+            <a:fillRect/>
+          </a:stretch>
+        </p:blipFill>
+        <p:spPr>
+          <a:xfrm>
+            <a:off x="17741900" y="6604000"/>
+            <a:ext cx="5499100" cy="3299460"/>
+          </a:xfrm>
+          <a:prstGeom prst="rect">
+            <a:avLst/>
+          </a:prstGeom>
+          <a:ln w="25400">
+            <a:miter lim="400000"/>
+          </a:ln>
+          <a:effectLst>
+            <a:outerShdw sx="100000" sy="100000" kx="0" ky="0" algn="b" rotWithShape="0" blurRad="254000" dist="127000" dir="5400000">
+              <a:srgbClr val="000000">
+                <a:alpha val="70000"/>
+              </a:srgbClr>
+            </a:outerShdw>
+          </a:effectLst>
+        </p:spPr>
+      </p:pic>
+      <p:pic>
+        <p:nvPicPr>
+          <p:cNvPr id="187" name="image.png" descr="image.png"/>
+          <p:cNvPicPr>
+            <a:picLocks noChangeAspect="1"/>
+          </p:cNvPicPr>
+          <p:nvPr/>
+        </p:nvPicPr>
+        <p:blipFill>
+          <a:blip r:embed="rId4">
+            <a:extLst/>
+          </a:blip>
+          <a:stretch>
+            <a:fillRect/>
+          </a:stretch>
+        </p:blipFill>
+        <p:spPr>
+          <a:xfrm>
+            <a:off x="17757018" y="10252709"/>
+            <a:ext cx="5483982" cy="2879091"/>
+          </a:xfrm>
+          <a:prstGeom prst="rect">
+            <a:avLst/>
+          </a:prstGeom>
+          <a:ln w="25400">
+            <a:miter lim="400000"/>
+          </a:ln>
+          <a:effectLst>
+            <a:outerShdw sx="100000" sy="100000" kx="0" ky="0" algn="b" rotWithShape="0" blurRad="254000" dist="127000" dir="5400000">
+              <a:srgbClr val="000000">
+                <a:alpha val="70000"/>
+              </a:srgbClr>
+            </a:outerShdw>
+          </a:effectLst>
+        </p:spPr>
+      </p:pic>
     </p:spTree>
   </p:cSld>
   <p:clrMapOvr>
     <a:masterClrMapping/>
   </p:clrMapOvr>
-  <p:transition xmlns:p14="http://schemas.microsoft.com/office/powerpoint/2010/main" spd="med" advClick="1"/>
+  <mc:AlternateContent xmlns:mc="http://schemas.openxmlformats.org/markup-compatibility/2006">
+    <mc:Choice xmlns:p159="http://schemas.microsoft.com/office/powerpoint/2015/09/main" Requires="p159">
+      <p:transition xmlns:p14="http://schemas.microsoft.com/office/powerpoint/2010/main" spd="slow" advClick="1" p14:dur="2000">
+        <p159:morph option="byObject"/>
+      </p:transition>
+    </mc:Choice>
+    <mc:Fallback>
+      <p:transition spd="slow">
+        <p:fade/>
+      </p:transition>
+    </mc:Fallback>
+  </mc:AlternateContent>
 </p:sld>
 </file>
 

</xml_diff>